<commit_message>
submit paper and blog about dialogue system
</commit_message>
<xml_diff>
--- a/my summary/知识图谱技术与主动式对话的应用.pptx
+++ b/my summary/知识图谱技术与主动式对话的应用.pptx
@@ -303,7 +303,7 @@
           <a:bodyPr lIns="0" rIns="0" tIns="0" bIns="0" anchor="b"/>
           <a:p>
             <a:pPr algn="r"/>
-            <a:fld id="{28036F5F-CA8D-4FAA-ACF1-ED94FC84B9B2}" type="slidenum">
+            <a:fld id="{CA9C14A2-D275-46C6-A68C-78E0348909B1}" type="slidenum">
               <a:rPr b="0" lang="en-US" sz="1400" spc="-1" strike="noStrike">
                 <a:solidFill>
                   <a:srgbClr val="000000"/>
@@ -423,7 +423,7 @@
                 <a:spcPct val="100000"/>
               </a:lnSpc>
             </a:pPr>
-            <a:fld id="{22C7CF77-719D-444C-8FA6-CAE0024B12CB}" type="slidenum">
+            <a:fld id="{4E7D97D5-AF3E-4204-A1A0-98C708BCCF4B}" type="slidenum">
               <a:rPr b="0" lang="en-US" sz="1200" spc="-1" strike="noStrike">
                 <a:solidFill>
                   <a:srgbClr val="000000"/>
@@ -667,7 +667,7 @@
                 <a:spcPct val="100000"/>
               </a:lnSpc>
             </a:pPr>
-            <a:fld id="{71E37D69-02E2-49F7-895A-3D4DA307BF05}" type="slidenum">
+            <a:fld id="{24850153-4EE6-422C-8485-F25AFC464931}" type="slidenum">
               <a:rPr b="0" lang="en-US" sz="1200" spc="-1" strike="noStrike">
                 <a:solidFill>
                   <a:srgbClr val="000000"/>
@@ -849,7 +849,7 @@
                 <a:spcPct val="100000"/>
               </a:lnSpc>
             </a:pPr>
-            <a:fld id="{993C9A31-0A9D-4AE4-84DD-B27D7ADBF7AD}" type="slidenum">
+            <a:fld id="{E0B0A9F4-0944-4E31-AEAE-8BB32CA32840}" type="slidenum">
               <a:rPr b="0" lang="en-US" sz="1200" spc="-1" strike="noStrike">
                 <a:solidFill>
                   <a:srgbClr val="000000"/>
@@ -1031,7 +1031,7 @@
                 <a:spcPct val="100000"/>
               </a:lnSpc>
             </a:pPr>
-            <a:fld id="{333E97B9-E8BC-4714-8D76-0204BC813BCC}" type="slidenum">
+            <a:fld id="{CF89148E-0403-4147-A9A9-11A8CAB1DC6A}" type="slidenum">
               <a:rPr b="0" lang="en-US" sz="1200" spc="-1" strike="noStrike">
                 <a:solidFill>
                   <a:srgbClr val="000000"/>
@@ -1302,7 +1302,7 @@
                 <a:spcPct val="100000"/>
               </a:lnSpc>
             </a:pPr>
-            <a:fld id="{B406221E-2A8E-4A1D-A18F-E092172921CD}" type="slidenum">
+            <a:fld id="{AA58D481-5D62-40C9-9217-35A308B76C38}" type="slidenum">
               <a:rPr b="0" lang="en-US" sz="1200" spc="-1" strike="noStrike">
                 <a:solidFill>
                   <a:srgbClr val="000000"/>
@@ -1484,7 +1484,7 @@
                 <a:spcPct val="100000"/>
               </a:lnSpc>
             </a:pPr>
-            <a:fld id="{0684C96A-9943-4142-B7AD-811A5E21B45D}" type="slidenum">
+            <a:fld id="{535DEB95-21C8-4EB8-BC4A-F20A84DC667B}" type="slidenum">
               <a:rPr b="0" lang="en-US" sz="1200" spc="-1" strike="noStrike">
                 <a:solidFill>
                   <a:srgbClr val="000000"/>
@@ -2087,7 +2087,7 @@
                 <a:spcPct val="100000"/>
               </a:lnSpc>
             </a:pPr>
-            <a:fld id="{844ACD86-34A8-4165-B38B-6C0749618714}" type="slidenum">
+            <a:fld id="{AB6A5213-6039-4CCE-93DB-AF06CDAA99C4}" type="slidenum">
               <a:rPr b="0" lang="en-US" sz="1200" spc="-1" strike="noStrike">
                 <a:solidFill>
                   <a:srgbClr val="000000"/>
@@ -2344,7 +2344,7 @@
                 <a:spcPct val="100000"/>
               </a:lnSpc>
             </a:pPr>
-            <a:fld id="{65815B64-6F2A-47F3-B5F9-A1F39B14A936}" type="slidenum">
+            <a:fld id="{2C230608-21C1-4084-9D04-F429DCDC5838}" type="slidenum">
               <a:rPr b="0" lang="en-US" sz="1200" spc="-1" strike="noStrike">
                 <a:solidFill>
                   <a:srgbClr val="000000"/>
@@ -6853,7 +6853,7 @@
                 <a:spcPct val="100000"/>
               </a:lnSpc>
             </a:pPr>
-            <a:fld id="{F92840CA-AD0F-4A01-8A06-6914E9E6D771}" type="slidenum">
+            <a:fld id="{8E6B612F-8B8E-4494-8506-EF7BFFBE9ECE}" type="slidenum">
               <a:rPr b="1" lang="en-US" sz="1400" spc="-1" strike="noStrike">
                 <a:solidFill>
                   <a:srgbClr val="464653"/>
@@ -7324,7 +7324,7 @@
                 <a:spcPct val="100000"/>
               </a:lnSpc>
             </a:pPr>
-            <a:fld id="{40B25707-EBA4-4AF9-AA82-97AD9AF1ECA1}" type="slidenum">
+            <a:fld id="{3D26A6FF-0C01-4434-A8E8-34D8D0CA87EA}" type="slidenum">
               <a:rPr b="1" lang="en-US" sz="1400" spc="-1" strike="noStrike">
                 <a:solidFill>
                   <a:srgbClr val="464653"/>
@@ -7915,7 +7915,7 @@
                 <a:spcPct val="100000"/>
               </a:lnSpc>
             </a:pPr>
-            <a:fld id="{6E475256-209B-41E6-8372-7EBC9F958966}" type="slidenum">
+            <a:fld id="{DC8E67F5-BBF5-4E17-BD9A-1F0B0F5FFD56}" type="slidenum">
               <a:rPr b="1" lang="en-US" sz="1400" spc="-1" strike="noStrike">
                 <a:solidFill>
                   <a:srgbClr val="464653"/>
@@ -8394,7 +8394,7 @@
                 <a:spcPct val="100000"/>
               </a:lnSpc>
             </a:pPr>
-            <a:fld id="{B3FDD032-044D-4B57-83C2-8A6A61FE10AD}" type="slidenum">
+            <a:fld id="{5A642857-DC46-4550-BC6F-DE8E10AB9AD6}" type="slidenum">
               <a:rPr b="1" lang="en-US" sz="1400" spc="-1" strike="noStrike">
                 <a:solidFill>
                   <a:srgbClr val="464653"/>
@@ -8886,7 +8886,7 @@
                 <a:spcPct val="100000"/>
               </a:lnSpc>
             </a:pPr>
-            <a:fld id="{0D64CE96-C633-4B20-B23D-9F74D00FED4F}" type="slidenum">
+            <a:fld id="{41A80E4C-4A82-4083-89FF-CB3F528C11C1}" type="slidenum">
               <a:rPr b="1" lang="en-US" sz="1400" spc="-1" strike="noStrike">
                 <a:solidFill>
                   <a:srgbClr val="464653"/>
@@ -10422,7 +10422,7 @@
                 <a:spcPct val="100000"/>
               </a:lnSpc>
             </a:pPr>
-            <a:fld id="{EDA1C8E0-E447-4D9C-AF72-6D5810F7CBA4}" type="slidenum">
+            <a:fld id="{B67D6EC5-4049-41F0-B057-064C9BC8555F}" type="slidenum">
               <a:rPr b="1" lang="en-US" sz="1400" spc="-1" strike="noStrike">
                 <a:solidFill>
                   <a:srgbClr val="464653"/>
@@ -10596,7 +10596,7 @@
                 <a:spcPct val="100000"/>
               </a:lnSpc>
             </a:pPr>
-            <a:fld id="{E91F7790-2DBF-482D-98FC-434688344AAF}" type="slidenum">
+            <a:fld id="{08AE156C-4B1E-40C3-88BA-1C2C7C65DE7A}" type="slidenum">
               <a:rPr b="1" lang="en-US" sz="1400" spc="-1" strike="noStrike">
                 <a:solidFill>
                   <a:srgbClr val="464653"/>
@@ -11667,7 +11667,7 @@
                 <a:spcPct val="100000"/>
               </a:lnSpc>
             </a:pPr>
-            <a:fld id="{A05625CD-E722-4B44-9AB1-409AE8B0A79B}" type="slidenum">
+            <a:fld id="{CACD74A4-1D06-4483-98E3-3485F8789A57}" type="slidenum">
               <a:rPr b="1" lang="en-US" sz="1400" spc="-1" strike="noStrike">
                 <a:solidFill>
                   <a:srgbClr val="464653"/>
@@ -11967,7 +11967,7 @@
                 <a:spcPct val="100000"/>
               </a:lnSpc>
             </a:pPr>
-            <a:fld id="{ADEF8A84-77DD-4103-9078-435E97A598D9}" type="slidenum">
+            <a:fld id="{8FA9FB0B-1645-4DBE-AF97-88E155085AC5}" type="slidenum">
               <a:rPr b="1" lang="en-US" sz="1400" spc="-1" strike="noStrike">
                 <a:solidFill>
                   <a:srgbClr val="464653"/>
@@ -12320,7 +12320,7 @@
                 <a:spcPct val="100000"/>
               </a:lnSpc>
             </a:pPr>
-            <a:fld id="{72AA5491-0DC8-4C88-B1A4-A0C498FAC6E7}" type="slidenum">
+            <a:fld id="{6ABC4441-A33E-4789-A294-74AAB2C42CE2}" type="slidenum">
               <a:rPr b="1" lang="en-US" sz="1400" spc="-1" strike="noStrike">
                 <a:solidFill>
                   <a:srgbClr val="464653"/>
@@ -13750,7 +13750,7 @@
                 <a:spcPct val="100000"/>
               </a:lnSpc>
             </a:pPr>
-            <a:fld id="{DE655732-ED44-4A33-B08A-3E9E448AEBF8}" type="slidenum">
+            <a:fld id="{9EA2E6EF-D7F8-463B-B06E-461A78022148}" type="slidenum">
               <a:rPr b="1" lang="en-US" sz="1400" spc="-1" strike="noStrike">
                 <a:solidFill>
                   <a:srgbClr val="464653"/>
@@ -14239,7 +14239,7 @@
                 <a:spcPct val="100000"/>
               </a:lnSpc>
             </a:pPr>
-            <a:fld id="{C2B1F18F-5F57-4A31-B5D6-7C07AE50BE8D}" type="slidenum">
+            <a:fld id="{BE7797E0-FE07-48A7-8EC7-75CC53CFC09C}" type="slidenum">
               <a:rPr b="1" lang="en-US" sz="1400" spc="-1" strike="noStrike">
                 <a:solidFill>
                   <a:srgbClr val="464653"/>
@@ -15517,7 +15517,7 @@
                 <a:spcPct val="100000"/>
               </a:lnSpc>
             </a:pPr>
-            <a:fld id="{05EAD0EA-BB13-48AF-B6ED-454D4C37A3E7}" type="slidenum">
+            <a:fld id="{45CE20C5-9F26-424A-9420-7B9921A140DC}" type="slidenum">
               <a:rPr b="1" lang="en-US" sz="1400" spc="-1" strike="noStrike">
                 <a:solidFill>
                   <a:srgbClr val="464653"/>

</xml_diff>

<commit_message>
submit paper about Event graph
</commit_message>
<xml_diff>
--- a/my summary/知识图谱技术与主动式对话的应用.pptx
+++ b/my summary/知识图谱技术与主动式对话的应用.pptx
@@ -303,7 +303,7 @@
           <a:bodyPr lIns="0" rIns="0" tIns="0" bIns="0" anchor="b"/>
           <a:p>
             <a:pPr algn="r"/>
-            <a:fld id="{CA9C14A2-D275-46C6-A68C-78E0348909B1}" type="slidenum">
+            <a:fld id="{87F2A36B-C171-4784-9D84-CB6998D749C1}" type="slidenum">
               <a:rPr b="0" lang="en-US" sz="1400" spc="-1" strike="noStrike">
                 <a:solidFill>
                   <a:srgbClr val="000000"/>
@@ -356,7 +356,7 @@
       </p:grpSpPr>
       <p:sp>
         <p:nvSpPr>
-          <p:cNvPr id="197" name="PlaceHolder 1"/>
+          <p:cNvPr id="198" name="PlaceHolder 1"/>
           <p:cNvSpPr>
             <a:spLocks noGrp="1"/>
           </p:cNvSpPr>
@@ -367,7 +367,7 @@
         <p:spPr>
           <a:xfrm>
             <a:off x="685800" y="4343400"/>
-            <a:ext cx="5485680" cy="4114080"/>
+            <a:ext cx="5485320" cy="4113720"/>
           </a:xfrm>
           <a:prstGeom prst="rect">
             <a:avLst/>
@@ -392,14 +392,14 @@
       </p:sp>
       <p:sp>
         <p:nvSpPr>
-          <p:cNvPr id="198" name="CustomShape 2"/>
+          <p:cNvPr id="199" name="CustomShape 2"/>
           <p:cNvSpPr/>
           <p:nvPr/>
         </p:nvSpPr>
         <p:spPr>
           <a:xfrm>
             <a:off x="3884760" y="8685360"/>
-            <a:ext cx="2971080" cy="456480"/>
+            <a:ext cx="2970720" cy="456120"/>
           </a:xfrm>
           <a:prstGeom prst="rect">
             <a:avLst/>
@@ -423,7 +423,7 @@
                 <a:spcPct val="100000"/>
               </a:lnSpc>
             </a:pPr>
-            <a:fld id="{4E7D97D5-AF3E-4204-A1A0-98C708BCCF4B}" type="slidenum">
+            <a:fld id="{E17ADF5E-5EF1-4DE9-9492-6854AEEAE9D0}" type="slidenum">
               <a:rPr b="0" lang="en-US" sz="1200" spc="-1" strike="noStrike">
                 <a:solidFill>
                   <a:srgbClr val="000000"/>
@@ -454,14 +454,14 @@
       </p:sp>
       <p:sp>
         <p:nvSpPr>
-          <p:cNvPr id="199" name="CustomShape 3"/>
+          <p:cNvPr id="200" name="CustomShape 3"/>
           <p:cNvSpPr/>
           <p:nvPr/>
         </p:nvSpPr>
         <p:spPr>
           <a:xfrm>
             <a:off x="3884760" y="0"/>
-            <a:ext cx="2971080" cy="456480"/>
+            <a:ext cx="2970720" cy="456120"/>
           </a:xfrm>
           <a:prstGeom prst="rect">
             <a:avLst/>
@@ -538,7 +538,7 @@
       </p:grpSpPr>
       <p:sp>
         <p:nvSpPr>
-          <p:cNvPr id="212" name="PlaceHolder 1"/>
+          <p:cNvPr id="213" name="PlaceHolder 1"/>
           <p:cNvSpPr>
             <a:spLocks noGrp="1"/>
           </p:cNvSpPr>
@@ -549,7 +549,7 @@
         <p:spPr>
           <a:xfrm>
             <a:off x="685800" y="4343400"/>
-            <a:ext cx="5485680" cy="4114080"/>
+            <a:ext cx="5485320" cy="4113720"/>
           </a:xfrm>
           <a:prstGeom prst="rect">
             <a:avLst/>
@@ -574,14 +574,14 @@
       </p:sp>
       <p:sp>
         <p:nvSpPr>
-          <p:cNvPr id="213" name="CustomShape 2"/>
+          <p:cNvPr id="214" name="CustomShape 2"/>
           <p:cNvSpPr/>
           <p:nvPr/>
         </p:nvSpPr>
         <p:spPr>
           <a:xfrm>
             <a:off x="3884760" y="0"/>
-            <a:ext cx="2971080" cy="456480"/>
+            <a:ext cx="2970720" cy="456120"/>
           </a:xfrm>
           <a:prstGeom prst="rect">
             <a:avLst/>
@@ -636,14 +636,14 @@
       </p:sp>
       <p:sp>
         <p:nvSpPr>
-          <p:cNvPr id="214" name="CustomShape 3"/>
+          <p:cNvPr id="215" name="CustomShape 3"/>
           <p:cNvSpPr/>
           <p:nvPr/>
         </p:nvSpPr>
         <p:spPr>
           <a:xfrm>
             <a:off x="3884760" y="8685360"/>
-            <a:ext cx="2971080" cy="456480"/>
+            <a:ext cx="2970720" cy="456120"/>
           </a:xfrm>
           <a:prstGeom prst="rect">
             <a:avLst/>
@@ -667,7 +667,7 @@
                 <a:spcPct val="100000"/>
               </a:lnSpc>
             </a:pPr>
-            <a:fld id="{24850153-4EE6-422C-8485-F25AFC464931}" type="slidenum">
+            <a:fld id="{FB46C5DE-6645-4053-87EF-7EB8420D3451}" type="slidenum">
               <a:rPr b="0" lang="en-US" sz="1200" spc="-1" strike="noStrike">
                 <a:solidFill>
                   <a:srgbClr val="000000"/>
@@ -680,7 +680,7 @@
                 <a:latin typeface="Arial"/>
                 <a:ea typeface="宋体"/>
               </a:rPr>
-              <a:t>1</a:t>
+              <a:t>&lt;编号&gt;</a:t>
             </a:fld>
             <a:endParaRPr b="0" lang="en-US" sz="1800" spc="-1" strike="noStrike">
               <a:solidFill>
@@ -720,7 +720,7 @@
       </p:grpSpPr>
       <p:sp>
         <p:nvSpPr>
-          <p:cNvPr id="215" name="PlaceHolder 1"/>
+          <p:cNvPr id="216" name="PlaceHolder 1"/>
           <p:cNvSpPr>
             <a:spLocks noGrp="1"/>
           </p:cNvSpPr>
@@ -731,7 +731,7 @@
         <p:spPr>
           <a:xfrm>
             <a:off x="685800" y="4343400"/>
-            <a:ext cx="5485680" cy="4114080"/>
+            <a:ext cx="5485320" cy="4113720"/>
           </a:xfrm>
           <a:prstGeom prst="rect">
             <a:avLst/>
@@ -756,14 +756,14 @@
       </p:sp>
       <p:sp>
         <p:nvSpPr>
-          <p:cNvPr id="216" name="CustomShape 2"/>
+          <p:cNvPr id="217" name="CustomShape 2"/>
           <p:cNvSpPr/>
           <p:nvPr/>
         </p:nvSpPr>
         <p:spPr>
           <a:xfrm>
             <a:off x="3884760" y="0"/>
-            <a:ext cx="2971080" cy="456480"/>
+            <a:ext cx="2970720" cy="456120"/>
           </a:xfrm>
           <a:prstGeom prst="rect">
             <a:avLst/>
@@ -818,14 +818,14 @@
       </p:sp>
       <p:sp>
         <p:nvSpPr>
-          <p:cNvPr id="217" name="CustomShape 3"/>
+          <p:cNvPr id="218" name="CustomShape 3"/>
           <p:cNvSpPr/>
           <p:nvPr/>
         </p:nvSpPr>
         <p:spPr>
           <a:xfrm>
             <a:off x="3884760" y="8685360"/>
-            <a:ext cx="2971080" cy="456480"/>
+            <a:ext cx="2970720" cy="456120"/>
           </a:xfrm>
           <a:prstGeom prst="rect">
             <a:avLst/>
@@ -849,7 +849,7 @@
                 <a:spcPct val="100000"/>
               </a:lnSpc>
             </a:pPr>
-            <a:fld id="{E0B0A9F4-0944-4E31-AEAE-8BB32CA32840}" type="slidenum">
+            <a:fld id="{37CACB57-1D5D-438F-B3AD-BA9D3AFDE674}" type="slidenum">
               <a:rPr b="0" lang="en-US" sz="1200" spc="-1" strike="noStrike">
                 <a:solidFill>
                   <a:srgbClr val="000000"/>
@@ -862,7 +862,7 @@
                 <a:latin typeface="Arial"/>
                 <a:ea typeface="宋体"/>
               </a:rPr>
-              <a:t>1</a:t>
+              <a:t>&lt;编号&gt;</a:t>
             </a:fld>
             <a:endParaRPr b="0" lang="en-US" sz="1800" spc="-1" strike="noStrike">
               <a:solidFill>
@@ -902,7 +902,7 @@
       </p:grpSpPr>
       <p:sp>
         <p:nvSpPr>
-          <p:cNvPr id="218" name="PlaceHolder 1"/>
+          <p:cNvPr id="219" name="PlaceHolder 1"/>
           <p:cNvSpPr>
             <a:spLocks noGrp="1"/>
           </p:cNvSpPr>
@@ -913,7 +913,7 @@
         <p:spPr>
           <a:xfrm>
             <a:off x="685800" y="4343400"/>
-            <a:ext cx="5485680" cy="4114080"/>
+            <a:ext cx="5485320" cy="4113720"/>
           </a:xfrm>
           <a:prstGeom prst="rect">
             <a:avLst/>
@@ -938,14 +938,14 @@
       </p:sp>
       <p:sp>
         <p:nvSpPr>
-          <p:cNvPr id="219" name="CustomShape 2"/>
+          <p:cNvPr id="220" name="CustomShape 2"/>
           <p:cNvSpPr/>
           <p:nvPr/>
         </p:nvSpPr>
         <p:spPr>
           <a:xfrm>
             <a:off x="3884760" y="0"/>
-            <a:ext cx="2971080" cy="456480"/>
+            <a:ext cx="2970720" cy="456120"/>
           </a:xfrm>
           <a:prstGeom prst="rect">
             <a:avLst/>
@@ -1000,14 +1000,14 @@
       </p:sp>
       <p:sp>
         <p:nvSpPr>
-          <p:cNvPr id="220" name="CustomShape 3"/>
+          <p:cNvPr id="221" name="CustomShape 3"/>
           <p:cNvSpPr/>
           <p:nvPr/>
         </p:nvSpPr>
         <p:spPr>
           <a:xfrm>
             <a:off x="3884760" y="8685360"/>
-            <a:ext cx="2971080" cy="456480"/>
+            <a:ext cx="2970720" cy="456120"/>
           </a:xfrm>
           <a:prstGeom prst="rect">
             <a:avLst/>
@@ -1031,7 +1031,7 @@
                 <a:spcPct val="100000"/>
               </a:lnSpc>
             </a:pPr>
-            <a:fld id="{CF89148E-0403-4147-A9A9-11A8CAB1DC6A}" type="slidenum">
+            <a:fld id="{E477DA79-FB2C-4499-BA8A-F7DD829C4D2C}" type="slidenum">
               <a:rPr b="0" lang="en-US" sz="1200" spc="-1" strike="noStrike">
                 <a:solidFill>
                   <a:srgbClr val="000000"/>
@@ -1084,7 +1084,7 @@
       </p:grpSpPr>
       <p:sp>
         <p:nvSpPr>
-          <p:cNvPr id="200" name="PlaceHolder 1"/>
+          <p:cNvPr id="201" name="PlaceHolder 1"/>
           <p:cNvSpPr>
             <a:spLocks noGrp="1"/>
           </p:cNvSpPr>
@@ -1095,7 +1095,7 @@
         <p:spPr>
           <a:xfrm>
             <a:off x="685800" y="4343400"/>
-            <a:ext cx="5485680" cy="4114080"/>
+            <a:ext cx="5485320" cy="4113720"/>
           </a:xfrm>
           <a:prstGeom prst="rect">
             <a:avLst/>
@@ -1209,14 +1209,14 @@
       </p:sp>
       <p:sp>
         <p:nvSpPr>
-          <p:cNvPr id="201" name="CustomShape 2"/>
+          <p:cNvPr id="202" name="CustomShape 2"/>
           <p:cNvSpPr/>
           <p:nvPr/>
         </p:nvSpPr>
         <p:spPr>
           <a:xfrm>
             <a:off x="3884760" y="0"/>
-            <a:ext cx="2971080" cy="456480"/>
+            <a:ext cx="2970720" cy="456120"/>
           </a:xfrm>
           <a:prstGeom prst="rect">
             <a:avLst/>
@@ -1271,14 +1271,14 @@
       </p:sp>
       <p:sp>
         <p:nvSpPr>
-          <p:cNvPr id="202" name="CustomShape 3"/>
+          <p:cNvPr id="203" name="CustomShape 3"/>
           <p:cNvSpPr/>
           <p:nvPr/>
         </p:nvSpPr>
         <p:spPr>
           <a:xfrm>
             <a:off x="3884760" y="8685360"/>
-            <a:ext cx="2971080" cy="456480"/>
+            <a:ext cx="2970720" cy="456120"/>
           </a:xfrm>
           <a:prstGeom prst="rect">
             <a:avLst/>
@@ -1302,7 +1302,7 @@
                 <a:spcPct val="100000"/>
               </a:lnSpc>
             </a:pPr>
-            <a:fld id="{AA58D481-5D62-40C9-9217-35A308B76C38}" type="slidenum">
+            <a:fld id="{DA8AC1E1-EDEC-4131-A2B5-52207D02332A}" type="slidenum">
               <a:rPr b="0" lang="en-US" sz="1200" spc="-1" strike="noStrike">
                 <a:solidFill>
                   <a:srgbClr val="000000"/>
@@ -1355,7 +1355,7 @@
       </p:grpSpPr>
       <p:sp>
         <p:nvSpPr>
-          <p:cNvPr id="203" name="PlaceHolder 1"/>
+          <p:cNvPr id="204" name="PlaceHolder 1"/>
           <p:cNvSpPr>
             <a:spLocks noGrp="1"/>
           </p:cNvSpPr>
@@ -1366,7 +1366,7 @@
         <p:spPr>
           <a:xfrm>
             <a:off x="685800" y="4343400"/>
-            <a:ext cx="5485680" cy="4114080"/>
+            <a:ext cx="5485320" cy="4113720"/>
           </a:xfrm>
           <a:prstGeom prst="rect">
             <a:avLst/>
@@ -1391,14 +1391,14 @@
       </p:sp>
       <p:sp>
         <p:nvSpPr>
-          <p:cNvPr id="204" name="CustomShape 2"/>
+          <p:cNvPr id="205" name="CustomShape 2"/>
           <p:cNvSpPr/>
           <p:nvPr/>
         </p:nvSpPr>
         <p:spPr>
           <a:xfrm>
             <a:off x="3884760" y="0"/>
-            <a:ext cx="2971080" cy="456480"/>
+            <a:ext cx="2970720" cy="456120"/>
           </a:xfrm>
           <a:prstGeom prst="rect">
             <a:avLst/>
@@ -1453,14 +1453,14 @@
       </p:sp>
       <p:sp>
         <p:nvSpPr>
-          <p:cNvPr id="205" name="CustomShape 3"/>
+          <p:cNvPr id="206" name="CustomShape 3"/>
           <p:cNvSpPr/>
           <p:nvPr/>
         </p:nvSpPr>
         <p:spPr>
           <a:xfrm>
             <a:off x="3884760" y="8685360"/>
-            <a:ext cx="2971080" cy="456480"/>
+            <a:ext cx="2970720" cy="456120"/>
           </a:xfrm>
           <a:prstGeom prst="rect">
             <a:avLst/>
@@ -1484,7 +1484,7 @@
                 <a:spcPct val="100000"/>
               </a:lnSpc>
             </a:pPr>
-            <a:fld id="{535DEB95-21C8-4EB8-BC4A-F20A84DC667B}" type="slidenum">
+            <a:fld id="{2BE55203-682B-4D10-B9A8-BC5E63A83BF5}" type="slidenum">
               <a:rPr b="0" lang="en-US" sz="1200" spc="-1" strike="noStrike">
                 <a:solidFill>
                   <a:srgbClr val="000000"/>
@@ -1537,7 +1537,7 @@
       </p:grpSpPr>
       <p:sp>
         <p:nvSpPr>
-          <p:cNvPr id="206" name="PlaceHolder 1"/>
+          <p:cNvPr id="207" name="PlaceHolder 1"/>
           <p:cNvSpPr>
             <a:spLocks noGrp="1"/>
           </p:cNvSpPr>
@@ -1548,7 +1548,7 @@
         <p:spPr>
           <a:xfrm>
             <a:off x="685800" y="4343400"/>
-            <a:ext cx="5485680" cy="4114080"/>
+            <a:ext cx="5485320" cy="4113720"/>
           </a:xfrm>
           <a:prstGeom prst="rect">
             <a:avLst/>
@@ -1994,14 +1994,14 @@
       </p:sp>
       <p:sp>
         <p:nvSpPr>
-          <p:cNvPr id="207" name="CustomShape 2"/>
+          <p:cNvPr id="208" name="CustomShape 2"/>
           <p:cNvSpPr/>
           <p:nvPr/>
         </p:nvSpPr>
         <p:spPr>
           <a:xfrm>
             <a:off x="3884760" y="0"/>
-            <a:ext cx="2971080" cy="456480"/>
+            <a:ext cx="2970720" cy="456120"/>
           </a:xfrm>
           <a:prstGeom prst="rect">
             <a:avLst/>
@@ -2056,14 +2056,14 @@
       </p:sp>
       <p:sp>
         <p:nvSpPr>
-          <p:cNvPr id="208" name="CustomShape 3"/>
+          <p:cNvPr id="209" name="CustomShape 3"/>
           <p:cNvSpPr/>
           <p:nvPr/>
         </p:nvSpPr>
         <p:spPr>
           <a:xfrm>
             <a:off x="3884760" y="8685360"/>
-            <a:ext cx="2971080" cy="456480"/>
+            <a:ext cx="2970720" cy="456120"/>
           </a:xfrm>
           <a:prstGeom prst="rect">
             <a:avLst/>
@@ -2087,7 +2087,7 @@
                 <a:spcPct val="100000"/>
               </a:lnSpc>
             </a:pPr>
-            <a:fld id="{AB6A5213-6039-4CCE-93DB-AF06CDAA99C4}" type="slidenum">
+            <a:fld id="{919450A3-915D-42C2-96A2-E24027787ACD}" type="slidenum">
               <a:rPr b="0" lang="en-US" sz="1200" spc="-1" strike="noStrike">
                 <a:solidFill>
                   <a:srgbClr val="000000"/>
@@ -2140,7 +2140,7 @@
       </p:grpSpPr>
       <p:sp>
         <p:nvSpPr>
-          <p:cNvPr id="209" name="PlaceHolder 1"/>
+          <p:cNvPr id="210" name="PlaceHolder 1"/>
           <p:cNvSpPr>
             <a:spLocks noGrp="1"/>
           </p:cNvSpPr>
@@ -2151,7 +2151,7 @@
         <p:spPr>
           <a:xfrm>
             <a:off x="685800" y="4343400"/>
-            <a:ext cx="5485680" cy="4114080"/>
+            <a:ext cx="5485320" cy="4113720"/>
           </a:xfrm>
           <a:prstGeom prst="rect">
             <a:avLst/>
@@ -2251,14 +2251,14 @@
       </p:sp>
       <p:sp>
         <p:nvSpPr>
-          <p:cNvPr id="210" name="CustomShape 2"/>
+          <p:cNvPr id="211" name="CustomShape 2"/>
           <p:cNvSpPr/>
           <p:nvPr/>
         </p:nvSpPr>
         <p:spPr>
           <a:xfrm>
             <a:off x="3884760" y="0"/>
-            <a:ext cx="2971080" cy="456480"/>
+            <a:ext cx="2970720" cy="456120"/>
           </a:xfrm>
           <a:prstGeom prst="rect">
             <a:avLst/>
@@ -2313,14 +2313,14 @@
       </p:sp>
       <p:sp>
         <p:nvSpPr>
-          <p:cNvPr id="211" name="CustomShape 3"/>
+          <p:cNvPr id="212" name="CustomShape 3"/>
           <p:cNvSpPr/>
           <p:nvPr/>
         </p:nvSpPr>
         <p:spPr>
           <a:xfrm>
             <a:off x="3884760" y="8685360"/>
-            <a:ext cx="2971080" cy="456480"/>
+            <a:ext cx="2970720" cy="456120"/>
           </a:xfrm>
           <a:prstGeom prst="rect">
             <a:avLst/>
@@ -2344,7 +2344,7 @@
                 <a:spcPct val="100000"/>
               </a:lnSpc>
             </a:pPr>
-            <a:fld id="{2C230608-21C1-4084-9D04-F429DCDC5838}" type="slidenum">
+            <a:fld id="{2330E87A-F66E-471A-9B98-CD58B024638F}" type="slidenum">
               <a:rPr b="0" lang="en-US" sz="1200" spc="-1" strike="noStrike">
                 <a:solidFill>
                   <a:srgbClr val="000000"/>
@@ -5369,7 +5369,7 @@
               <a:schemeClr val="accent2"/>
             </a:solidFill>
             <a:custDash>
-              <a:ds d="600000" sp="500000"/>
+              <a:ds d="800000" sp="600000"/>
             </a:custDash>
             <a:round/>
           </a:ln>
@@ -5400,7 +5400,7 @@
               <a:schemeClr val="accent2"/>
             </a:solidFill>
             <a:custDash>
-              <a:ds d="600000" sp="500000"/>
+              <a:ds d="800000" sp="600000"/>
             </a:custDash>
             <a:round/>
           </a:ln>
@@ -5420,8 +5420,8 @@
         </p:nvSpPr>
         <p:spPr>
           <a:xfrm rot="5400000">
-            <a:off x="419760" y="6467400"/>
-            <a:ext cx="190080" cy="119520"/>
+            <a:off x="420120" y="6467400"/>
+            <a:ext cx="189720" cy="119160"/>
           </a:xfrm>
           <a:prstGeom prst="triangle">
             <a:avLst>
@@ -5464,7 +5464,7 @@
         <p:spPr>
           <a:xfrm>
             <a:off x="905040" y="3648240"/>
-            <a:ext cx="7314480" cy="1279440"/>
+            <a:ext cx="7314120" cy="1279080"/>
           </a:xfrm>
           <a:prstGeom prst="rect">
             <a:avLst/>
@@ -5506,7 +5506,7 @@
         <p:spPr>
           <a:xfrm>
             <a:off x="914400" y="5048280"/>
-            <a:ext cx="7314480" cy="685080"/>
+            <a:ext cx="7314120" cy="684720"/>
           </a:xfrm>
           <a:prstGeom prst="rect">
             <a:avLst/>
@@ -5548,7 +5548,7 @@
         <p:spPr>
           <a:xfrm>
             <a:off x="905040" y="3648240"/>
-            <a:ext cx="227880" cy="1279440"/>
+            <a:ext cx="227520" cy="1279080"/>
           </a:xfrm>
           <a:prstGeom prst="rect">
             <a:avLst/>
@@ -5589,7 +5589,7 @@
         <p:spPr>
           <a:xfrm>
             <a:off x="914400" y="5048280"/>
-            <a:ext cx="227880" cy="685080"/>
+            <a:ext cx="227520" cy="684720"/>
           </a:xfrm>
           <a:prstGeom prst="rect">
             <a:avLst/>
@@ -5633,8 +5633,8 @@
         </p:nvSpPr>
         <p:spPr>
           <a:xfrm>
-            <a:off x="457200" y="152280"/>
-            <a:ext cx="8228880" cy="990000"/>
+            <a:off x="457200" y="273600"/>
+            <a:ext cx="8228880" cy="1144440"/>
           </a:xfrm>
           <a:prstGeom prst="rect">
             <a:avLst/>
@@ -5671,7 +5671,7 @@
         <p:spPr>
           <a:xfrm>
             <a:off x="457200" y="1604520"/>
-            <a:ext cx="8229240" cy="3977280"/>
+            <a:ext cx="8228880" cy="3976920"/>
           </a:xfrm>
           <a:prstGeom prst="rect">
             <a:avLst/>
@@ -5689,7 +5689,7 @@
               <a:buChar char=""/>
             </a:pPr>
             <a:r>
-              <a:rPr b="0" lang="en-US" sz="3200" spc="-1" strike="noStrike">
+              <a:rPr b="0" lang="en-US" sz="1800" spc="-1" strike="noStrike">
                 <a:solidFill>
                   <a:srgbClr val="000000"/>
                 </a:solidFill>
@@ -5702,7 +5702,7 @@
               </a:rPr>
               <a:t>单击鼠标编辑大纲文字格式</a:t>
             </a:r>
-            <a:endParaRPr b="0" lang="en-US" sz="3200" spc="-1" strike="noStrike">
+            <a:endParaRPr b="0" lang="en-US" sz="1800" spc="-1" strike="noStrike">
               <a:solidFill>
                 <a:srgbClr val="000000"/>
               </a:solidFill>
@@ -5724,7 +5724,7 @@
               <a:buChar char=""/>
             </a:pPr>
             <a:r>
-              <a:rPr b="0" lang="en-US" sz="2800" spc="-1" strike="noStrike">
+              <a:rPr b="0" lang="en-US" sz="1800" spc="-1" strike="noStrike">
                 <a:solidFill>
                   <a:srgbClr val="000000"/>
                 </a:solidFill>
@@ -5737,7 +5737,7 @@
               </a:rPr>
               <a:t>第二个大纲级</a:t>
             </a:r>
-            <a:endParaRPr b="0" lang="en-US" sz="2800" spc="-1" strike="noStrike">
+            <a:endParaRPr b="0" lang="en-US" sz="1800" spc="-1" strike="noStrike">
               <a:solidFill>
                 <a:srgbClr val="000000"/>
               </a:solidFill>
@@ -5759,7 +5759,7 @@
               <a:buChar char=""/>
             </a:pPr>
             <a:r>
-              <a:rPr b="0" lang="en-US" sz="2400" spc="-1" strike="noStrike">
+              <a:rPr b="0" lang="en-US" sz="1800" spc="-1" strike="noStrike">
                 <a:solidFill>
                   <a:srgbClr val="000000"/>
                 </a:solidFill>
@@ -5772,7 +5772,7 @@
               </a:rPr>
               <a:t>第三大纲级别</a:t>
             </a:r>
-            <a:endParaRPr b="0" lang="en-US" sz="2400" spc="-1" strike="noStrike">
+            <a:endParaRPr b="0" lang="en-US" sz="1800" spc="-1" strike="noStrike">
               <a:solidFill>
                 <a:srgbClr val="000000"/>
               </a:solidFill>
@@ -5794,7 +5794,7 @@
               <a:buChar char=""/>
             </a:pPr>
             <a:r>
-              <a:rPr b="0" lang="en-US" sz="2000" spc="-1" strike="noStrike">
+              <a:rPr b="0" lang="en-US" sz="1800" spc="-1" strike="noStrike">
                 <a:solidFill>
                   <a:srgbClr val="000000"/>
                 </a:solidFill>
@@ -5807,7 +5807,7 @@
               </a:rPr>
               <a:t>第四大纲级别</a:t>
             </a:r>
-            <a:endParaRPr b="0" lang="en-US" sz="2000" spc="-1" strike="noStrike">
+            <a:endParaRPr b="0" lang="en-US" sz="1800" spc="-1" strike="noStrike">
               <a:solidFill>
                 <a:srgbClr val="000000"/>
               </a:solidFill>
@@ -5829,7 +5829,7 @@
               <a:buChar char=""/>
             </a:pPr>
             <a:r>
-              <a:rPr b="0" lang="en-US" sz="2000" spc="-1" strike="noStrike">
+              <a:rPr b="0" lang="en-US" sz="1800" spc="-1" strike="noStrike">
                 <a:solidFill>
                   <a:srgbClr val="000000"/>
                 </a:solidFill>
@@ -5842,7 +5842,7 @@
               </a:rPr>
               <a:t>第五大纲级别</a:t>
             </a:r>
-            <a:endParaRPr b="0" lang="en-US" sz="2000" spc="-1" strike="noStrike">
+            <a:endParaRPr b="0" lang="en-US" sz="1800" spc="-1" strike="noStrike">
               <a:solidFill>
                 <a:srgbClr val="000000"/>
               </a:solidFill>
@@ -5864,7 +5864,7 @@
               <a:buChar char=""/>
             </a:pPr>
             <a:r>
-              <a:rPr b="0" lang="en-US" sz="2000" spc="-1" strike="noStrike">
+              <a:rPr b="0" lang="en-US" sz="1800" spc="-1" strike="noStrike">
                 <a:solidFill>
                   <a:srgbClr val="000000"/>
                 </a:solidFill>
@@ -5877,7 +5877,7 @@
               </a:rPr>
               <a:t>第六大纲级别</a:t>
             </a:r>
-            <a:endParaRPr b="0" lang="en-US" sz="2000" spc="-1" strike="noStrike">
+            <a:endParaRPr b="0" lang="en-US" sz="1800" spc="-1" strike="noStrike">
               <a:solidFill>
                 <a:srgbClr val="000000"/>
               </a:solidFill>
@@ -5899,7 +5899,7 @@
               <a:buChar char=""/>
             </a:pPr>
             <a:r>
-              <a:rPr b="0" lang="en-US" sz="2000" spc="-1" strike="noStrike">
+              <a:rPr b="0" lang="en-US" sz="1800" spc="-1" strike="noStrike">
                 <a:solidFill>
                   <a:srgbClr val="000000"/>
                 </a:solidFill>
@@ -5912,7 +5912,7 @@
               </a:rPr>
               <a:t>第七大纲级别</a:t>
             </a:r>
-            <a:endParaRPr b="0" lang="en-US" sz="2000" spc="-1" strike="noStrike">
+            <a:endParaRPr b="0" lang="en-US" sz="1800" spc="-1" strike="noStrike">
               <a:solidFill>
                 <a:srgbClr val="000000"/>
               </a:solidFill>
@@ -5989,7 +5989,7 @@
               <a:schemeClr val="accent2"/>
             </a:solidFill>
             <a:custDash>
-              <a:ds d="600000" sp="500000"/>
+              <a:ds d="800000" sp="600000"/>
             </a:custDash>
             <a:round/>
           </a:ln>
@@ -6020,7 +6020,7 @@
               <a:schemeClr val="accent2"/>
             </a:solidFill>
             <a:custDash>
-              <a:ds d="600000" sp="500000"/>
+              <a:ds d="800000" sp="600000"/>
             </a:custDash>
             <a:round/>
           </a:ln>
@@ -6040,8 +6040,8 @@
         </p:nvSpPr>
         <p:spPr>
           <a:xfrm rot="5400000">
-            <a:off x="419760" y="6467400"/>
-            <a:ext cx="190080" cy="119520"/>
+            <a:off x="420120" y="6467400"/>
+            <a:ext cx="189720" cy="119160"/>
           </a:xfrm>
           <a:prstGeom prst="triangle">
             <a:avLst>
@@ -6440,7 +6440,7 @@
         <p:spPr>
           <a:xfrm>
             <a:off x="1815840" y="3944880"/>
-            <a:ext cx="5832000" cy="591120"/>
+            <a:ext cx="5831640" cy="590760"/>
           </a:xfrm>
           <a:prstGeom prst="rect">
             <a:avLst/>
@@ -6470,6 +6470,7 @@
                   </a:solidFill>
                 </a:uFill>
                 <a:latin typeface="Arial"/>
+                <a:ea typeface="DejaVu Sans"/>
               </a:rPr>
               <a:t>知识图谱关键技术与主动式对话系统</a:t>
             </a:r>
@@ -6514,7 +6515,7 @@
         <p:spPr>
           <a:xfrm>
             <a:off x="1062360" y="5040000"/>
-            <a:ext cx="6857280" cy="680040"/>
+            <a:ext cx="6856920" cy="679680"/>
           </a:xfrm>
           <a:prstGeom prst="rect">
             <a:avLst/>
@@ -6584,7 +6585,7 @@
                 <a:latin typeface="Arial"/>
                 <a:ea typeface="AR PL UKai CN"/>
               </a:rPr>
-              <a:t>   </a:t>
+              <a:t>  </a:t>
             </a:r>
             <a:endParaRPr b="0" lang="en-US" sz="1800" spc="-1" strike="noStrike">
               <a:solidFill>
@@ -6604,21 +6605,6 @@
                 <a:spcPct val="100000"/>
               </a:lnSpc>
             </a:pPr>
-            <a:r>
-              <a:rPr b="0" lang="en-US" sz="1200" spc="-1" strike="noStrike">
-                <a:solidFill>
-                  <a:srgbClr val="464653"/>
-                </a:solidFill>
-                <a:uFill>
-                  <a:solidFill>
-                    <a:srgbClr val="ffffff"/>
-                  </a:solidFill>
-                </a:uFill>
-                <a:latin typeface="Arial"/>
-                <a:ea typeface="AR PL UKai CN"/>
-              </a:rPr>
-              <a:t>    </a:t>
-            </a:r>
             <a:r>
               <a:rPr b="0" lang="en-US" sz="1200" spc="-1" strike="noStrike">
                 <a:solidFill>
@@ -6706,7 +6692,7 @@
         <p:spPr>
           <a:xfrm>
             <a:off x="0" y="260640"/>
-            <a:ext cx="3647520" cy="780480"/>
+            <a:ext cx="3647160" cy="780120"/>
           </a:xfrm>
           <a:prstGeom prst="rect">
             <a:avLst/>
@@ -6730,7 +6716,7 @@
         <p:spPr>
           <a:xfrm>
             <a:off x="3888000" y="1233720"/>
-            <a:ext cx="3743280" cy="2049480"/>
+            <a:ext cx="3742920" cy="2049120"/>
           </a:xfrm>
           <a:prstGeom prst="rect">
             <a:avLst/>
@@ -6756,7 +6742,7 @@
         <p:spPr>
           <a:xfrm>
             <a:off x="1872000" y="1233720"/>
-            <a:ext cx="3311640" cy="2077920"/>
+            <a:ext cx="3311280" cy="2077560"/>
           </a:xfrm>
           <a:prstGeom prst="rect">
             <a:avLst/>
@@ -6822,14 +6808,14 @@
       </p:grpSpPr>
       <p:sp>
         <p:nvSpPr>
-          <p:cNvPr id="164" name="CustomShape 1"/>
+          <p:cNvPr id="165" name="CustomShape 1"/>
           <p:cNvSpPr/>
           <p:nvPr/>
         </p:nvSpPr>
         <p:spPr>
           <a:xfrm>
             <a:off x="612720" y="6375600"/>
-            <a:ext cx="1980360" cy="365040"/>
+            <a:ext cx="1980000" cy="364680"/>
           </a:xfrm>
           <a:prstGeom prst="rect">
             <a:avLst/>
@@ -6853,7 +6839,7 @@
                 <a:spcPct val="100000"/>
               </a:lnSpc>
             </a:pPr>
-            <a:fld id="{8E6B612F-8B8E-4494-8506-EF7BFFBE9ECE}" type="slidenum">
+            <a:fld id="{628288E0-BC76-4C75-B284-07F751B1F26C}" type="slidenum">
               <a:rPr b="1" lang="en-US" sz="1400" spc="-1" strike="noStrike">
                 <a:solidFill>
                   <a:srgbClr val="464653"/>
@@ -6884,14 +6870,14 @@
       </p:sp>
       <p:sp>
         <p:nvSpPr>
-          <p:cNvPr id="165" name="CustomShape 2"/>
+          <p:cNvPr id="166" name="CustomShape 2"/>
           <p:cNvSpPr/>
           <p:nvPr/>
         </p:nvSpPr>
         <p:spPr>
           <a:xfrm>
             <a:off x="457200" y="152280"/>
-            <a:ext cx="8228880" cy="990000"/>
+            <a:ext cx="8228520" cy="989640"/>
           </a:xfrm>
           <a:prstGeom prst="rect">
             <a:avLst/>
@@ -6946,14 +6932,14 @@
       </p:sp>
       <p:sp>
         <p:nvSpPr>
-          <p:cNvPr id="166" name="CustomShape 3"/>
+          <p:cNvPr id="167" name="CustomShape 3"/>
           <p:cNvSpPr/>
           <p:nvPr/>
         </p:nvSpPr>
         <p:spPr>
           <a:xfrm>
             <a:off x="451800" y="1268640"/>
-            <a:ext cx="8691480" cy="2315520"/>
+            <a:ext cx="8691120" cy="2315160"/>
           </a:xfrm>
           <a:prstGeom prst="rect">
             <a:avLst/>
@@ -6972,7 +6958,7 @@
         <p:txBody>
           <a:bodyPr lIns="90000" rIns="90000" tIns="45000" bIns="45000"/>
           <a:p>
-            <a:pPr marL="457200" indent="-456480">
+            <a:pPr marL="457200" indent="-456120">
               <a:lnSpc>
                 <a:spcPct val="100000"/>
               </a:lnSpc>
@@ -7025,7 +7011,7 @@
             </a:endParaRPr>
           </a:p>
           <a:p>
-            <a:pPr marL="457200" indent="-456480">
+            <a:pPr marL="457200" indent="-456120">
               <a:lnSpc>
                 <a:spcPct val="100000"/>
               </a:lnSpc>
@@ -7186,7 +7172,7 @@
       </p:sp>
       <p:pic>
         <p:nvPicPr>
-          <p:cNvPr id="167" name="Picture 2" descr=""/>
+          <p:cNvPr id="168" name="Picture 2" descr=""/>
           <p:cNvPicPr/>
           <p:nvPr/>
         </p:nvPicPr>
@@ -7197,7 +7183,7 @@
         <p:spPr>
           <a:xfrm>
             <a:off x="1166760" y="2147760"/>
-            <a:ext cx="6809760" cy="3232080"/>
+            <a:ext cx="6809400" cy="3231720"/>
           </a:xfrm>
           <a:prstGeom prst="rect">
             <a:avLst/>
@@ -7209,14 +7195,14 @@
       </p:pic>
       <p:sp>
         <p:nvSpPr>
-          <p:cNvPr id="168" name="CustomShape 4"/>
+          <p:cNvPr id="169" name="CustomShape 4"/>
           <p:cNvSpPr/>
           <p:nvPr/>
         </p:nvSpPr>
         <p:spPr>
           <a:xfrm>
             <a:off x="5220000" y="5014080"/>
-            <a:ext cx="1511280" cy="366120"/>
+            <a:ext cx="1510920" cy="365760"/>
           </a:xfrm>
           <a:prstGeom prst="rect">
             <a:avLst/>
@@ -7293,14 +7279,14 @@
       </p:grpSpPr>
       <p:sp>
         <p:nvSpPr>
-          <p:cNvPr id="169" name="CustomShape 1"/>
+          <p:cNvPr id="170" name="CustomShape 1"/>
           <p:cNvSpPr/>
           <p:nvPr/>
         </p:nvSpPr>
         <p:spPr>
           <a:xfrm>
             <a:off x="612720" y="6375600"/>
-            <a:ext cx="1980360" cy="365040"/>
+            <a:ext cx="1980000" cy="364680"/>
           </a:xfrm>
           <a:prstGeom prst="rect">
             <a:avLst/>
@@ -7324,7 +7310,7 @@
                 <a:spcPct val="100000"/>
               </a:lnSpc>
             </a:pPr>
-            <a:fld id="{3D26A6FF-0C01-4434-A8E8-34D8D0CA87EA}" type="slidenum">
+            <a:fld id="{389A1724-86FD-428B-B605-2142214FC950}" type="slidenum">
               <a:rPr b="1" lang="en-US" sz="1400" spc="-1" strike="noStrike">
                 <a:solidFill>
                   <a:srgbClr val="464653"/>
@@ -7355,14 +7341,14 @@
       </p:sp>
       <p:sp>
         <p:nvSpPr>
-          <p:cNvPr id="170" name="CustomShape 2"/>
+          <p:cNvPr id="171" name="CustomShape 2"/>
           <p:cNvSpPr/>
           <p:nvPr/>
         </p:nvSpPr>
         <p:spPr>
           <a:xfrm>
             <a:off x="457200" y="152280"/>
-            <a:ext cx="8228880" cy="990000"/>
+            <a:ext cx="8228520" cy="989640"/>
           </a:xfrm>
           <a:prstGeom prst="rect">
             <a:avLst/>
@@ -7417,14 +7403,14 @@
       </p:sp>
       <p:sp>
         <p:nvSpPr>
-          <p:cNvPr id="171" name="CustomShape 3"/>
+          <p:cNvPr id="172" name="CustomShape 3"/>
           <p:cNvSpPr/>
           <p:nvPr/>
         </p:nvSpPr>
         <p:spPr>
           <a:xfrm>
             <a:off x="323640" y="1268640"/>
-            <a:ext cx="7830360" cy="1431360"/>
+            <a:ext cx="7830000" cy="1431000"/>
           </a:xfrm>
           <a:prstGeom prst="rect">
             <a:avLst/>
@@ -7443,7 +7429,7 @@
         <p:txBody>
           <a:bodyPr lIns="90000" rIns="90000" tIns="45000" bIns="45000"/>
           <a:p>
-            <a:pPr marL="457200" indent="-456480">
+            <a:pPr marL="457200" indent="-456120">
               <a:lnSpc>
                 <a:spcPct val="100000"/>
               </a:lnSpc>
@@ -7481,7 +7467,7 @@
             </a:endParaRPr>
           </a:p>
           <a:p>
-            <a:pPr marL="457200" indent="-456480">
+            <a:pPr marL="457200" indent="-456120">
               <a:lnSpc>
                 <a:spcPct val="100000"/>
               </a:lnSpc>
@@ -7549,7 +7535,7 @@
             </a:endParaRPr>
           </a:p>
           <a:p>
-            <a:pPr marL="457200" indent="-456480">
+            <a:pPr marL="457200" indent="-456120">
               <a:lnSpc>
                 <a:spcPct val="100000"/>
               </a:lnSpc>
@@ -7710,7 +7696,7 @@
       </p:sp>
       <p:pic>
         <p:nvPicPr>
-          <p:cNvPr id="172" name="图片 3" descr=""/>
+          <p:cNvPr id="173" name="图片 3" descr=""/>
           <p:cNvPicPr/>
           <p:nvPr/>
         </p:nvPicPr>
@@ -7721,7 +7707,7 @@
         <p:spPr>
           <a:xfrm>
             <a:off x="1459440" y="3069000"/>
-            <a:ext cx="6224760" cy="1952280"/>
+            <a:ext cx="6224400" cy="1951920"/>
           </a:xfrm>
           <a:prstGeom prst="rect">
             <a:avLst/>
@@ -7789,14 +7775,14 @@
       </p:grpSpPr>
       <p:sp>
         <p:nvSpPr>
-          <p:cNvPr id="173" name="CustomShape 1"/>
+          <p:cNvPr id="174" name="CustomShape 1"/>
           <p:cNvSpPr/>
           <p:nvPr/>
         </p:nvSpPr>
         <p:spPr>
           <a:xfrm>
             <a:off x="2051640" y="1917000"/>
-            <a:ext cx="2397600" cy="730080"/>
+            <a:ext cx="2397240" cy="729720"/>
           </a:xfrm>
           <a:prstGeom prst="rect">
             <a:avLst/>
@@ -7884,14 +7870,14 @@
       </p:sp>
       <p:sp>
         <p:nvSpPr>
-          <p:cNvPr id="174" name="CustomShape 2"/>
+          <p:cNvPr id="175" name="CustomShape 2"/>
           <p:cNvSpPr/>
           <p:nvPr/>
         </p:nvSpPr>
         <p:spPr>
           <a:xfrm>
             <a:off x="612720" y="6375600"/>
-            <a:ext cx="1980360" cy="365040"/>
+            <a:ext cx="1980000" cy="364680"/>
           </a:xfrm>
           <a:prstGeom prst="rect">
             <a:avLst/>
@@ -7915,7 +7901,7 @@
                 <a:spcPct val="100000"/>
               </a:lnSpc>
             </a:pPr>
-            <a:fld id="{DC8E67F5-BBF5-4E17-BD9A-1F0B0F5FFD56}" type="slidenum">
+            <a:fld id="{EEC6078F-2AD7-4B84-8100-193F90E0B561}" type="slidenum">
               <a:rPr b="1" lang="en-US" sz="1400" spc="-1" strike="noStrike">
                 <a:solidFill>
                   <a:srgbClr val="464653"/>
@@ -7946,14 +7932,14 @@
       </p:sp>
       <p:sp>
         <p:nvSpPr>
-          <p:cNvPr id="175" name="CustomShape 3"/>
+          <p:cNvPr id="176" name="CustomShape 3"/>
           <p:cNvSpPr/>
           <p:nvPr/>
         </p:nvSpPr>
         <p:spPr>
           <a:xfrm>
             <a:off x="457200" y="152280"/>
-            <a:ext cx="8228880" cy="990000"/>
+            <a:ext cx="8228520" cy="989640"/>
           </a:xfrm>
           <a:prstGeom prst="rect">
             <a:avLst/>
@@ -8008,14 +7994,14 @@
       </p:sp>
       <p:sp>
         <p:nvSpPr>
-          <p:cNvPr id="176" name="CustomShape 4"/>
+          <p:cNvPr id="177" name="CustomShape 4"/>
           <p:cNvSpPr/>
           <p:nvPr/>
         </p:nvSpPr>
         <p:spPr>
           <a:xfrm>
             <a:off x="457200" y="1272960"/>
-            <a:ext cx="8506440" cy="4963680"/>
+            <a:ext cx="8506080" cy="4963320"/>
           </a:xfrm>
           <a:prstGeom prst="rect">
             <a:avLst/>
@@ -8034,7 +8020,7 @@
         <p:txBody>
           <a:bodyPr lIns="90000" rIns="90000" tIns="45000" bIns="45000"/>
           <a:p>
-            <a:pPr marL="457200" indent="-456480">
+            <a:pPr marL="457200" indent="-456120">
               <a:lnSpc>
                 <a:spcPct val="100000"/>
               </a:lnSpc>
@@ -8073,7 +8059,7 @@
             </a:endParaRPr>
           </a:p>
           <a:p>
-            <a:pPr marL="274320" indent="-273600">
+            <a:pPr marL="274320" indent="-273240">
               <a:lnSpc>
                 <a:spcPct val="100000"/>
               </a:lnSpc>
@@ -8112,7 +8098,7 @@
             </a:endParaRPr>
           </a:p>
           <a:p>
-            <a:pPr marL="274320" indent="-273600">
+            <a:pPr marL="274320" indent="-273240">
               <a:lnSpc>
                 <a:spcPct val="100000"/>
               </a:lnSpc>
@@ -8151,7 +8137,7 @@
             </a:endParaRPr>
           </a:p>
           <a:p>
-            <a:pPr marL="274320" indent="-273600">
+            <a:pPr marL="274320" indent="-273240">
               <a:lnSpc>
                 <a:spcPct val="100000"/>
               </a:lnSpc>
@@ -8193,14 +8179,14 @@
       </p:sp>
       <p:sp>
         <p:nvSpPr>
-          <p:cNvPr id="177" name="CustomShape 5"/>
+          <p:cNvPr id="178" name="CustomShape 5"/>
           <p:cNvSpPr/>
           <p:nvPr/>
         </p:nvSpPr>
         <p:spPr>
           <a:xfrm>
             <a:off x="4419720" y="3276720"/>
-            <a:ext cx="304200" cy="304200"/>
+            <a:ext cx="303840" cy="303840"/>
           </a:xfrm>
           <a:prstGeom prst="rect">
             <a:avLst/>
@@ -8268,14 +8254,14 @@
       </p:grpSpPr>
       <p:sp>
         <p:nvSpPr>
-          <p:cNvPr id="178" name="CustomShape 1"/>
+          <p:cNvPr id="179" name="CustomShape 1"/>
           <p:cNvSpPr/>
           <p:nvPr/>
         </p:nvSpPr>
         <p:spPr>
           <a:xfrm>
             <a:off x="2051640" y="1917000"/>
-            <a:ext cx="2397600" cy="730080"/>
+            <a:ext cx="2397240" cy="729720"/>
           </a:xfrm>
           <a:prstGeom prst="rect">
             <a:avLst/>
@@ -8363,14 +8349,14 @@
       </p:sp>
       <p:sp>
         <p:nvSpPr>
-          <p:cNvPr id="179" name="CustomShape 2"/>
+          <p:cNvPr id="180" name="CustomShape 2"/>
           <p:cNvSpPr/>
           <p:nvPr/>
         </p:nvSpPr>
         <p:spPr>
           <a:xfrm>
             <a:off x="612720" y="6375600"/>
-            <a:ext cx="1980360" cy="365040"/>
+            <a:ext cx="1980000" cy="364680"/>
           </a:xfrm>
           <a:prstGeom prst="rect">
             <a:avLst/>
@@ -8394,7 +8380,7 @@
                 <a:spcPct val="100000"/>
               </a:lnSpc>
             </a:pPr>
-            <a:fld id="{5A642857-DC46-4550-BC6F-DE8E10AB9AD6}" type="slidenum">
+            <a:fld id="{FCF3370F-F46A-4C46-8B0B-A4D0ED3D15DF}" type="slidenum">
               <a:rPr b="1" lang="en-US" sz="1400" spc="-1" strike="noStrike">
                 <a:solidFill>
                   <a:srgbClr val="464653"/>
@@ -8425,14 +8411,14 @@
       </p:sp>
       <p:sp>
         <p:nvSpPr>
-          <p:cNvPr id="180" name="CustomShape 3"/>
+          <p:cNvPr id="181" name="CustomShape 3"/>
           <p:cNvSpPr/>
           <p:nvPr/>
         </p:nvSpPr>
         <p:spPr>
           <a:xfrm>
             <a:off x="457200" y="152280"/>
-            <a:ext cx="8228880" cy="990000"/>
+            <a:ext cx="8228520" cy="989640"/>
           </a:xfrm>
           <a:prstGeom prst="rect">
             <a:avLst/>
@@ -8487,14 +8473,14 @@
       </p:sp>
       <p:sp>
         <p:nvSpPr>
-          <p:cNvPr id="181" name="CustomShape 4"/>
+          <p:cNvPr id="182" name="CustomShape 4"/>
           <p:cNvSpPr/>
           <p:nvPr/>
         </p:nvSpPr>
         <p:spPr>
           <a:xfrm>
             <a:off x="457200" y="1272960"/>
-            <a:ext cx="8506440" cy="4963680"/>
+            <a:ext cx="8506080" cy="4963320"/>
           </a:xfrm>
           <a:prstGeom prst="rect">
             <a:avLst/>
@@ -8513,7 +8499,7 @@
         <p:txBody>
           <a:bodyPr lIns="90000" rIns="90000" tIns="45000" bIns="45000"/>
           <a:p>
-            <a:pPr marL="274320" indent="-273600">
+            <a:pPr marL="274320" indent="-273240">
               <a:lnSpc>
                 <a:spcPct val="100000"/>
               </a:lnSpc>
@@ -8535,6 +8521,7 @@
                   </a:solidFill>
                 </a:uFill>
                 <a:latin typeface="Gill Sans MT"/>
+                <a:ea typeface="DejaVu Sans"/>
               </a:rPr>
               <a:t>中文的命名实体识别与英文的相比，挑战更大。</a:t>
             </a:r>
@@ -8551,7 +8538,7 @@
             </a:endParaRPr>
           </a:p>
           <a:p>
-            <a:pPr marL="274320" indent="-273600">
+            <a:pPr marL="274320" indent="-273240">
               <a:lnSpc>
                 <a:spcPct val="100000"/>
               </a:lnSpc>
@@ -8573,6 +8560,7 @@
                   </a:solidFill>
                 </a:uFill>
                 <a:latin typeface="Gill Sans MT"/>
+                <a:ea typeface="DejaVu Sans"/>
               </a:rPr>
               <a:t>现代汉语日新月异的发展给命名实体识别也带来了新的困难。</a:t>
             </a:r>
@@ -8589,7 +8577,7 @@
             </a:endParaRPr>
           </a:p>
           <a:p>
-            <a:pPr marL="274320" indent="-273600">
+            <a:pPr marL="274320" indent="-273240">
               <a:lnSpc>
                 <a:spcPct val="100000"/>
               </a:lnSpc>
@@ -8611,6 +8599,7 @@
                   </a:solidFill>
                 </a:uFill>
                 <a:latin typeface="Gill Sans MT"/>
+                <a:ea typeface="DejaVu Sans"/>
               </a:rPr>
               <a:t>命名实体歧义严重，消歧困难。</a:t>
             </a:r>
@@ -8648,14 +8637,14 @@
       </p:sp>
       <p:sp>
         <p:nvSpPr>
-          <p:cNvPr id="182" name="CustomShape 5"/>
+          <p:cNvPr id="183" name="CustomShape 5"/>
           <p:cNvSpPr/>
           <p:nvPr/>
         </p:nvSpPr>
         <p:spPr>
           <a:xfrm>
             <a:off x="4419720" y="3276720"/>
-            <a:ext cx="304200" cy="304200"/>
+            <a:ext cx="303840" cy="303840"/>
           </a:xfrm>
           <a:prstGeom prst="rect">
             <a:avLst/>
@@ -8674,7 +8663,7 @@
       </p:sp>
       <p:pic>
         <p:nvPicPr>
-          <p:cNvPr id="183" name="图片 3" descr=""/>
+          <p:cNvPr id="184" name="图片 3" descr=""/>
           <p:cNvPicPr/>
           <p:nvPr/>
         </p:nvPicPr>
@@ -8685,7 +8674,7 @@
         <p:spPr>
           <a:xfrm>
             <a:off x="3266280" y="3299400"/>
-            <a:ext cx="3726000" cy="2442240"/>
+            <a:ext cx="3725640" cy="2441880"/>
           </a:xfrm>
           <a:prstGeom prst="rect">
             <a:avLst/>
@@ -8760,14 +8749,14 @@
       </p:grpSpPr>
       <p:sp>
         <p:nvSpPr>
-          <p:cNvPr id="184" name="CustomShape 1"/>
+          <p:cNvPr id="185" name="CustomShape 1"/>
           <p:cNvSpPr/>
           <p:nvPr/>
         </p:nvSpPr>
         <p:spPr>
           <a:xfrm>
             <a:off x="2051640" y="1917000"/>
-            <a:ext cx="2397600" cy="730080"/>
+            <a:ext cx="2397240" cy="729720"/>
           </a:xfrm>
           <a:prstGeom prst="rect">
             <a:avLst/>
@@ -8855,14 +8844,14 @@
       </p:sp>
       <p:sp>
         <p:nvSpPr>
-          <p:cNvPr id="185" name="CustomShape 2"/>
+          <p:cNvPr id="186" name="CustomShape 2"/>
           <p:cNvSpPr/>
           <p:nvPr/>
         </p:nvSpPr>
         <p:spPr>
           <a:xfrm>
             <a:off x="612720" y="6375600"/>
-            <a:ext cx="1980360" cy="365040"/>
+            <a:ext cx="1980000" cy="364680"/>
           </a:xfrm>
           <a:prstGeom prst="rect">
             <a:avLst/>
@@ -8886,7 +8875,7 @@
                 <a:spcPct val="100000"/>
               </a:lnSpc>
             </a:pPr>
-            <a:fld id="{41A80E4C-4A82-4083-89FF-CB3F528C11C1}" type="slidenum">
+            <a:fld id="{760CA5FB-F3B0-4624-B601-93BADC4C3DDA}" type="slidenum">
               <a:rPr b="1" lang="en-US" sz="1400" spc="-1" strike="noStrike">
                 <a:solidFill>
                   <a:srgbClr val="464653"/>
@@ -8917,14 +8906,14 @@
       </p:sp>
       <p:sp>
         <p:nvSpPr>
-          <p:cNvPr id="186" name="CustomShape 3"/>
+          <p:cNvPr id="187" name="CustomShape 3"/>
           <p:cNvSpPr/>
           <p:nvPr/>
         </p:nvSpPr>
         <p:spPr>
           <a:xfrm>
             <a:off x="457200" y="1272960"/>
-            <a:ext cx="8506440" cy="4963680"/>
+            <a:ext cx="8506080" cy="4963320"/>
           </a:xfrm>
           <a:prstGeom prst="rect">
             <a:avLst/>
@@ -9018,14 +9007,14 @@
       </p:sp>
       <p:sp>
         <p:nvSpPr>
-          <p:cNvPr id="187" name="CustomShape 4"/>
+          <p:cNvPr id="188" name="CustomShape 4"/>
           <p:cNvSpPr/>
           <p:nvPr/>
         </p:nvSpPr>
         <p:spPr>
           <a:xfrm>
             <a:off x="4419720" y="3276720"/>
-            <a:ext cx="304200" cy="304200"/>
+            <a:ext cx="303840" cy="303840"/>
           </a:xfrm>
           <a:prstGeom prst="rect">
             <a:avLst/>
@@ -9044,7 +9033,7 @@
       </p:sp>
       <p:pic>
         <p:nvPicPr>
-          <p:cNvPr id="188" name="Picture 4" descr=""/>
+          <p:cNvPr id="189" name="Picture 4" descr=""/>
           <p:cNvPicPr/>
           <p:nvPr/>
         </p:nvPicPr>
@@ -9055,7 +9044,7 @@
         <p:spPr>
           <a:xfrm>
             <a:off x="227520" y="261360"/>
-            <a:ext cx="3647520" cy="780480"/>
+            <a:ext cx="3647160" cy="780120"/>
           </a:xfrm>
           <a:prstGeom prst="rect">
             <a:avLst/>
@@ -9067,14 +9056,14 @@
       </p:pic>
       <p:sp>
         <p:nvSpPr>
-          <p:cNvPr id="189" name="CustomShape 5"/>
+          <p:cNvPr id="190" name="CustomShape 5"/>
           <p:cNvSpPr/>
           <p:nvPr/>
         </p:nvSpPr>
         <p:spPr>
           <a:xfrm rot="5400000">
-            <a:off x="1927800" y="3050280"/>
-            <a:ext cx="1139400" cy="1896480"/>
+            <a:off x="1928160" y="3050280"/>
+            <a:ext cx="1139040" cy="1896120"/>
           </a:xfrm>
           <a:prstGeom prst="corner">
             <a:avLst>
@@ -9187,14 +9176,14 @@
       </p:sp>
       <p:sp>
         <p:nvSpPr>
-          <p:cNvPr id="190" name="CustomShape 6"/>
+          <p:cNvPr id="191" name="CustomShape 6"/>
           <p:cNvSpPr/>
           <p:nvPr/>
         </p:nvSpPr>
         <p:spPr>
           <a:xfrm>
             <a:off x="1737000" y="3617640"/>
-            <a:ext cx="1711800" cy="1500480"/>
+            <a:ext cx="1711440" cy="1500120"/>
           </a:xfrm>
           <a:prstGeom prst="rect">
             <a:avLst/>
@@ -9249,14 +9238,14 @@
       </p:sp>
       <p:sp>
         <p:nvSpPr>
-          <p:cNvPr id="191" name="CustomShape 7"/>
+          <p:cNvPr id="192" name="CustomShape 7"/>
           <p:cNvSpPr/>
           <p:nvPr/>
         </p:nvSpPr>
         <p:spPr>
           <a:xfrm>
             <a:off x="3126600" y="2910960"/>
-            <a:ext cx="322560" cy="322560"/>
+            <a:ext cx="322200" cy="322200"/>
           </a:xfrm>
           <a:prstGeom prst="triangle">
             <a:avLst>
@@ -9368,14 +9357,14 @@
       </p:sp>
       <p:sp>
         <p:nvSpPr>
-          <p:cNvPr id="192" name="CustomShape 8"/>
+          <p:cNvPr id="193" name="CustomShape 8"/>
           <p:cNvSpPr/>
           <p:nvPr/>
         </p:nvSpPr>
         <p:spPr>
           <a:xfrm rot="5400000">
-            <a:off x="4024440" y="2531520"/>
-            <a:ext cx="1139400" cy="1896480"/>
+            <a:off x="4024800" y="2531520"/>
+            <a:ext cx="1139040" cy="1896120"/>
           </a:xfrm>
           <a:prstGeom prst="corner">
             <a:avLst>
@@ -9488,14 +9477,14 @@
       </p:sp>
       <p:sp>
         <p:nvSpPr>
-          <p:cNvPr id="193" name="CustomShape 9"/>
+          <p:cNvPr id="194" name="CustomShape 9"/>
           <p:cNvSpPr/>
           <p:nvPr/>
         </p:nvSpPr>
         <p:spPr>
           <a:xfrm>
             <a:off x="3833640" y="3098520"/>
-            <a:ext cx="1711800" cy="1500480"/>
+            <a:ext cx="1711440" cy="1500120"/>
           </a:xfrm>
           <a:prstGeom prst="rect">
             <a:avLst/>
@@ -9550,14 +9539,14 @@
       </p:sp>
       <p:sp>
         <p:nvSpPr>
-          <p:cNvPr id="194" name="CustomShape 10"/>
+          <p:cNvPr id="195" name="CustomShape 10"/>
           <p:cNvSpPr/>
           <p:nvPr/>
         </p:nvSpPr>
         <p:spPr>
           <a:xfrm>
             <a:off x="5223240" y="2392200"/>
-            <a:ext cx="322560" cy="322560"/>
+            <a:ext cx="322200" cy="322200"/>
           </a:xfrm>
           <a:prstGeom prst="triangle">
             <a:avLst>
@@ -9669,14 +9658,14 @@
       </p:sp>
       <p:sp>
         <p:nvSpPr>
-          <p:cNvPr id="195" name="CustomShape 11"/>
+          <p:cNvPr id="196" name="CustomShape 11"/>
           <p:cNvSpPr/>
           <p:nvPr/>
         </p:nvSpPr>
         <p:spPr>
           <a:xfrm rot="5400000">
-            <a:off x="6121080" y="2012760"/>
-            <a:ext cx="1139400" cy="1896480"/>
+            <a:off x="6121440" y="2012760"/>
+            <a:ext cx="1139040" cy="1896120"/>
           </a:xfrm>
           <a:prstGeom prst="corner">
             <a:avLst>
@@ -9789,14 +9778,14 @@
       </p:sp>
       <p:sp>
         <p:nvSpPr>
-          <p:cNvPr id="196" name="CustomShape 12"/>
+          <p:cNvPr id="197" name="CustomShape 12"/>
           <p:cNvSpPr/>
           <p:nvPr/>
         </p:nvSpPr>
         <p:spPr>
           <a:xfrm>
             <a:off x="5930280" y="2579760"/>
-            <a:ext cx="1711800" cy="1500480"/>
+            <a:ext cx="1711440" cy="1500120"/>
           </a:xfrm>
           <a:prstGeom prst="rect">
             <a:avLst/>
@@ -9907,7 +9896,7 @@
         <p:spPr>
           <a:xfrm>
             <a:off x="457200" y="152280"/>
-            <a:ext cx="8228880" cy="990000"/>
+            <a:ext cx="8228520" cy="989640"/>
           </a:xfrm>
           <a:prstGeom prst="rect">
             <a:avLst/>
@@ -9969,7 +9958,7 @@
         <p:spPr>
           <a:xfrm>
             <a:off x="495360" y="1325520"/>
-            <a:ext cx="8152560" cy="4852440"/>
+            <a:ext cx="8152200" cy="4852080"/>
           </a:xfrm>
           <a:prstGeom prst="rect">
             <a:avLst/>
@@ -9988,7 +9977,7 @@
         <p:txBody>
           <a:bodyPr lIns="90000" rIns="90000" tIns="45000" bIns="45000"/>
           <a:p>
-            <a:pPr marL="274320" indent="-273600">
+            <a:pPr marL="274320" indent="-273240">
               <a:lnSpc>
                 <a:spcPct val="100000"/>
               </a:lnSpc>
@@ -10023,12 +10012,11 @@
                   <a:srgbClr val="ffffff"/>
                 </a:solidFill>
               </a:uFill>
-              <a:latin typeface="AR PL UKai CN"/>
-              <a:ea typeface="AR PL UKai CN"/>
-            </a:endParaRPr>
-          </a:p>
-          <a:p>
-            <a:pPr lvl="1" marL="432000" indent="-216000">
+              <a:latin typeface="Arial"/>
+            </a:endParaRPr>
+          </a:p>
+          <a:p>
+            <a:pPr lvl="1" marL="432000" indent="-215640">
               <a:lnSpc>
                 <a:spcPct val="100000"/>
               </a:lnSpc>
@@ -10040,7 +10028,7 @@
               <a:buChar char=""/>
             </a:pPr>
             <a:r>
-              <a:rPr b="0" lang="en-US" sz="3200" spc="-1" strike="noStrike">
+              <a:rPr b="0" lang="en-US" sz="2600" spc="-1" strike="noStrike">
                 <a:solidFill>
                   <a:srgbClr val="000000"/>
                 </a:solidFill>
@@ -10063,12 +10051,11 @@
                   <a:srgbClr val="ffffff"/>
                 </a:solidFill>
               </a:uFill>
-              <a:latin typeface="AR PL UKai CN"/>
-              <a:ea typeface="AR PL UKai CN"/>
-            </a:endParaRPr>
-          </a:p>
-          <a:p>
-            <a:pPr lvl="1" marL="432000" indent="-216000">
+              <a:latin typeface="Arial"/>
+            </a:endParaRPr>
+          </a:p>
+          <a:p>
+            <a:pPr lvl="1" marL="432000" indent="-215640">
               <a:lnSpc>
                 <a:spcPct val="100000"/>
               </a:lnSpc>
@@ -10080,7 +10067,7 @@
               <a:buChar char=""/>
             </a:pPr>
             <a:r>
-              <a:rPr b="0" lang="en-US" sz="3200" spc="-1" strike="noStrike">
+              <a:rPr b="0" lang="en-US" sz="2600" spc="-1" strike="noStrike">
                 <a:solidFill>
                   <a:srgbClr val="000000"/>
                 </a:solidFill>
@@ -10103,12 +10090,11 @@
                   <a:srgbClr val="ffffff"/>
                 </a:solidFill>
               </a:uFill>
-              <a:latin typeface="AR PL UKai CN"/>
-              <a:ea typeface="AR PL UKai CN"/>
-            </a:endParaRPr>
-          </a:p>
-          <a:p>
-            <a:pPr lvl="1" marL="432000" indent="-216000">
+              <a:latin typeface="Arial"/>
+            </a:endParaRPr>
+          </a:p>
+          <a:p>
+            <a:pPr lvl="1" marL="432000" indent="-215640">
               <a:lnSpc>
                 <a:spcPct val="100000"/>
               </a:lnSpc>
@@ -10120,7 +10106,7 @@
               <a:buChar char=""/>
             </a:pPr>
             <a:r>
-              <a:rPr b="0" lang="en-US" sz="3200" spc="-1" strike="noStrike">
+              <a:rPr b="0" lang="en-US" sz="2600" spc="-1" strike="noStrike">
                 <a:solidFill>
                   <a:srgbClr val="000000"/>
                 </a:solidFill>
@@ -10143,12 +10129,11 @@
                   <a:srgbClr val="ffffff"/>
                 </a:solidFill>
               </a:uFill>
-              <a:latin typeface="AR PL UKai CN"/>
-              <a:ea typeface="AR PL UKai CN"/>
-            </a:endParaRPr>
-          </a:p>
-          <a:p>
-            <a:pPr lvl="1" marL="432000" indent="-216000">
+              <a:latin typeface="Arial"/>
+            </a:endParaRPr>
+          </a:p>
+          <a:p>
+            <a:pPr lvl="1" marL="432000" indent="-215640">
               <a:lnSpc>
                 <a:spcPct val="100000"/>
               </a:lnSpc>
@@ -10160,7 +10145,7 @@
               <a:buChar char=""/>
             </a:pPr>
             <a:r>
-              <a:rPr b="0" lang="en-US" sz="3200" spc="-1" strike="noStrike">
+              <a:rPr b="0" lang="en-US" sz="2600" spc="-1" strike="noStrike">
                 <a:solidFill>
                   <a:srgbClr val="000000"/>
                 </a:solidFill>
@@ -10183,12 +10168,11 @@
                   <a:srgbClr val="ffffff"/>
                 </a:solidFill>
               </a:uFill>
-              <a:latin typeface="AR PL UKai CN"/>
-              <a:ea typeface="AR PL UKai CN"/>
-            </a:endParaRPr>
-          </a:p>
-          <a:p>
-            <a:pPr lvl="1" marL="432000" indent="-216000">
+              <a:latin typeface="Arial"/>
+            </a:endParaRPr>
+          </a:p>
+          <a:p>
+            <a:pPr lvl="1" marL="432000" indent="-215640">
               <a:lnSpc>
                 <a:spcPct val="100000"/>
               </a:lnSpc>
@@ -10200,7 +10184,7 @@
               <a:buChar char=""/>
             </a:pPr>
             <a:r>
-              <a:rPr b="0" lang="en-US" sz="3200" spc="-1" strike="noStrike">
+              <a:rPr b="0" lang="en-US" sz="2600" spc="-1" strike="noStrike">
                 <a:solidFill>
                   <a:srgbClr val="000000"/>
                 </a:solidFill>
@@ -10223,12 +10207,11 @@
                   <a:srgbClr val="ffffff"/>
                 </a:solidFill>
               </a:uFill>
-              <a:latin typeface="AR PL UKai CN"/>
-              <a:ea typeface="AR PL UKai CN"/>
-            </a:endParaRPr>
-          </a:p>
-          <a:p>
-            <a:pPr marL="274320" indent="-273600">
+              <a:latin typeface="Arial"/>
+            </a:endParaRPr>
+          </a:p>
+          <a:p>
+            <a:pPr marL="274320" indent="-273240">
               <a:lnSpc>
                 <a:spcPct val="100000"/>
               </a:lnSpc>
@@ -10242,7 +10225,7 @@
             <a:r>
               <a:rPr b="0" lang="en-US" sz="3600" spc="-1" strike="noStrike">
                 <a:solidFill>
-                  <a:srgbClr val="000000"/>
+                  <a:srgbClr val="0000ff"/>
                 </a:solidFill>
                 <a:uFill>
                   <a:solidFill>
@@ -10252,7 +10235,7 @@
                 <a:latin typeface="AR PL UKai CN"/>
                 <a:ea typeface="AR PL UKai CN"/>
               </a:rPr>
-              <a:t>主动式对话系统</a:t>
+              <a:t>事理图谱</a:t>
             </a:r>
             <a:endParaRPr b="0" lang="en-US" sz="1800" spc="-1" strike="noStrike">
               <a:solidFill>
@@ -10263,16 +10246,54 @@
                   <a:srgbClr val="ffffff"/>
                 </a:solidFill>
               </a:uFill>
-              <a:latin typeface="AR PL UKai CN"/>
-              <a:ea typeface="AR PL UKai CN"/>
-            </a:endParaRPr>
-          </a:p>
-          <a:p>
-            <a:pPr lvl="1" marL="432000" indent="-216000">
+              <a:latin typeface="Arial"/>
+            </a:endParaRPr>
+          </a:p>
+          <a:p>
+            <a:pPr marL="274320" indent="-273240">
               <a:lnSpc>
                 <a:spcPct val="100000"/>
               </a:lnSpc>
               <a:buClr>
+                <a:srgbClr val="727ca3"/>
+              </a:buClr>
+              <a:buSzPct val="76000"/>
+              <a:buFont typeface="Wingdings 3" charset="2"/>
+              <a:buChar char=""/>
+            </a:pPr>
+            <a:r>
+              <a:rPr b="0" lang="en-US" sz="3600" spc="-1" strike="noStrike">
+                <a:solidFill>
+                  <a:srgbClr val="000000"/>
+                </a:solidFill>
+                <a:uFill>
+                  <a:solidFill>
+                    <a:srgbClr val="ffffff"/>
+                  </a:solidFill>
+                </a:uFill>
+                <a:latin typeface="AR PL UKai CN"/>
+                <a:ea typeface="AR PL UKai CN"/>
+              </a:rPr>
+              <a:t>主动式对话系统</a:t>
+            </a:r>
+            <a:endParaRPr b="0" lang="en-US" sz="1800" spc="-1" strike="noStrike">
+              <a:solidFill>
+                <a:srgbClr val="000000"/>
+              </a:solidFill>
+              <a:uFill>
+                <a:solidFill>
+                  <a:srgbClr val="ffffff"/>
+                </a:solidFill>
+              </a:uFill>
+              <a:latin typeface="Arial"/>
+            </a:endParaRPr>
+          </a:p>
+          <a:p>
+            <a:pPr lvl="1" marL="432000" indent="-215640">
+              <a:lnSpc>
+                <a:spcPct val="100000"/>
+              </a:lnSpc>
+              <a:buClr>
                 <a:srgbClr val="000000"/>
               </a:buClr>
               <a:buSzPct val="45000"/>
@@ -10280,7 +10301,7 @@
               <a:buChar char=""/>
             </a:pPr>
             <a:r>
-              <a:rPr b="0" lang="en-US" sz="3200" spc="-1" strike="noStrike">
+              <a:rPr b="0" lang="en-US" sz="2600" spc="-1" strike="noStrike">
                 <a:solidFill>
                   <a:srgbClr val="000000"/>
                 </a:solidFill>
@@ -10303,12 +10324,11 @@
                   <a:srgbClr val="ffffff"/>
                 </a:solidFill>
               </a:uFill>
-              <a:latin typeface="AR PL UKai CN"/>
-              <a:ea typeface="AR PL UKai CN"/>
-            </a:endParaRPr>
-          </a:p>
-          <a:p>
-            <a:pPr lvl="1" marL="432000" indent="-216000">
+              <a:latin typeface="Arial"/>
+            </a:endParaRPr>
+          </a:p>
+          <a:p>
+            <a:pPr lvl="1" marL="432000" indent="-215640">
               <a:lnSpc>
                 <a:spcPct val="100000"/>
               </a:lnSpc>
@@ -10320,7 +10340,7 @@
               <a:buChar char=""/>
             </a:pPr>
             <a:r>
-              <a:rPr b="0" lang="en-US" sz="3200" spc="-1" strike="noStrike">
+              <a:rPr b="0" lang="en-US" sz="2600" spc="-1" strike="noStrike">
                 <a:solidFill>
                   <a:srgbClr val="000000"/>
                 </a:solidFill>
@@ -10343,12 +10363,11 @@
                   <a:srgbClr val="ffffff"/>
                 </a:solidFill>
               </a:uFill>
-              <a:latin typeface="AR PL UKai CN"/>
-              <a:ea typeface="AR PL UKai CN"/>
-            </a:endParaRPr>
-          </a:p>
-          <a:p>
-            <a:pPr lvl="1" marL="432000" indent="-216000">
+              <a:latin typeface="Arial"/>
+            </a:endParaRPr>
+          </a:p>
+          <a:p>
+            <a:pPr lvl="1" marL="432000" indent="-215640">
               <a:lnSpc>
                 <a:spcPct val="100000"/>
               </a:lnSpc>
@@ -10360,7 +10379,7 @@
               <a:buChar char=""/>
             </a:pPr>
             <a:r>
-              <a:rPr b="0" lang="en-US" sz="3200" spc="-1" strike="noStrike">
+              <a:rPr b="0" lang="en-US" sz="2600" spc="-1" strike="noStrike">
                 <a:solidFill>
                   <a:srgbClr val="000000"/>
                 </a:solidFill>
@@ -10383,8 +10402,7 @@
                   <a:srgbClr val="ffffff"/>
                 </a:solidFill>
               </a:uFill>
-              <a:latin typeface="AR PL UKai CN"/>
-              <a:ea typeface="AR PL UKai CN"/>
+              <a:latin typeface="Arial"/>
             </a:endParaRPr>
           </a:p>
         </p:txBody>
@@ -10398,7 +10416,7 @@
         <p:spPr>
           <a:xfrm>
             <a:off x="612720" y="6375600"/>
-            <a:ext cx="1980360" cy="365040"/>
+            <a:ext cx="1980000" cy="364680"/>
           </a:xfrm>
           <a:prstGeom prst="rect">
             <a:avLst/>
@@ -10422,7 +10440,7 @@
                 <a:spcPct val="100000"/>
               </a:lnSpc>
             </a:pPr>
-            <a:fld id="{B67D6EC5-4049-41F0-B057-064C9BC8555F}" type="slidenum">
+            <a:fld id="{5654C97E-3DA7-44E1-A506-FD5D62612BF6}" type="slidenum">
               <a:rPr b="1" lang="en-US" sz="1400" spc="-1" strike="noStrike">
                 <a:solidFill>
                   <a:srgbClr val="464653"/>
@@ -10450,6 +10468,26 @@
             </a:endParaRPr>
           </a:p>
         </p:txBody>
+      </p:sp>
+      <p:sp>
+        <p:nvSpPr>
+          <p:cNvPr id="95" name="TextShape 4"/>
+          <p:cNvSpPr txBox="1"/>
+          <p:nvPr/>
+        </p:nvSpPr>
+        <p:spPr>
+          <a:xfrm>
+            <a:off x="355680" y="4321080"/>
+            <a:ext cx="180720" cy="429120"/>
+          </a:xfrm>
+          <a:prstGeom prst="rect">
+            <a:avLst/>
+          </a:prstGeom>
+          <a:noFill/>
+          <a:ln>
+            <a:noFill/>
+          </a:ln>
+        </p:spPr>
       </p:sp>
     </p:spTree>
   </p:cSld>
@@ -10502,14 +10540,14 @@
       </p:grpSpPr>
       <p:sp>
         <p:nvSpPr>
-          <p:cNvPr id="95" name="CustomShape 1"/>
+          <p:cNvPr id="96" name="CustomShape 1"/>
           <p:cNvSpPr/>
           <p:nvPr/>
         </p:nvSpPr>
         <p:spPr>
           <a:xfrm>
             <a:off x="323640" y="116640"/>
-            <a:ext cx="8152560" cy="990000"/>
+            <a:ext cx="8152200" cy="989640"/>
           </a:xfrm>
           <a:prstGeom prst="rect">
             <a:avLst/>
@@ -10557,22 +10595,21 @@
                   <a:srgbClr val="ffffff"/>
                 </a:solidFill>
               </a:uFill>
-              <a:latin typeface="AR PL UKai CN"/>
-              <a:ea typeface="AR PL UKai CN"/>
+              <a:latin typeface="Arial"/>
             </a:endParaRPr>
           </a:p>
         </p:txBody>
       </p:sp>
       <p:sp>
         <p:nvSpPr>
-          <p:cNvPr id="96" name="CustomShape 2"/>
+          <p:cNvPr id="97" name="CustomShape 2"/>
           <p:cNvSpPr/>
           <p:nvPr/>
         </p:nvSpPr>
         <p:spPr>
           <a:xfrm>
             <a:off x="612720" y="6375600"/>
-            <a:ext cx="1980360" cy="365040"/>
+            <a:ext cx="1980000" cy="364680"/>
           </a:xfrm>
           <a:prstGeom prst="rect">
             <a:avLst/>
@@ -10596,7 +10633,7 @@
                 <a:spcPct val="100000"/>
               </a:lnSpc>
             </a:pPr>
-            <a:fld id="{08AE156C-4B1E-40C3-88BA-1C2C7C65DE7A}" type="slidenum">
+            <a:fld id="{D0B22152-53F8-4EFA-B1DA-ADE7AB931255}" type="slidenum">
               <a:rPr b="1" lang="en-US" sz="1400" spc="-1" strike="noStrike">
                 <a:solidFill>
                   <a:srgbClr val="464653"/>
@@ -10627,14 +10664,14 @@
       </p:sp>
       <p:sp>
         <p:nvSpPr>
-          <p:cNvPr id="97" name="CustomShape 3"/>
+          <p:cNvPr id="98" name="CustomShape 3"/>
           <p:cNvSpPr/>
           <p:nvPr/>
         </p:nvSpPr>
         <p:spPr>
           <a:xfrm>
             <a:off x="457200" y="1219320"/>
-            <a:ext cx="8228880" cy="4937040"/>
+            <a:ext cx="8228520" cy="4936680"/>
           </a:xfrm>
           <a:prstGeom prst="rect">
             <a:avLst/>
@@ -10653,7 +10690,7 @@
         <p:txBody>
           <a:bodyPr lIns="90000" rIns="90000" tIns="45000" bIns="45000"/>
           <a:p>
-            <a:pPr marL="274320" indent="-273600">
+            <a:pPr marL="274320" indent="-273240">
               <a:lnSpc>
                 <a:spcPct val="100000"/>
               </a:lnSpc>
@@ -10679,7 +10716,7 @@
               </a:rPr>
               <a:t>知识获取</a:t>
             </a:r>
-            <a:endParaRPr b="0" lang="en-US" sz="1600" spc="-1" strike="noStrike">
+            <a:endParaRPr b="0" lang="en-US" sz="1800" spc="-1" strike="noStrike">
               <a:solidFill>
                 <a:srgbClr val="000000"/>
               </a:solidFill>
@@ -10697,7 +10734,7 @@
                 <a:spcPct val="100000"/>
               </a:lnSpc>
             </a:pPr>
-            <a:endParaRPr b="0" lang="en-US" sz="1600" spc="-1" strike="noStrike">
+            <a:endParaRPr b="0" lang="en-US" sz="1800" spc="-1" strike="noStrike">
               <a:solidFill>
                 <a:srgbClr val="000000"/>
               </a:solidFill>
@@ -10745,20 +10782,20 @@
               </a:rPr>
               <a:t>多样性</a:t>
             </a:r>
-            <a:endParaRPr b="0" lang="en-US" sz="1600" spc="-1" strike="noStrike">
-              <a:solidFill>
-                <a:srgbClr val="000000"/>
-              </a:solidFill>
-              <a:uFill>
-                <a:solidFill>
-                  <a:srgbClr val="ffffff"/>
-                </a:solidFill>
-              </a:uFill>
-              <a:latin typeface="Arial"/>
-            </a:endParaRPr>
-          </a:p>
-          <a:p>
-            <a:pPr marL="274320" indent="-273600">
+            <a:endParaRPr b="0" lang="en-US" sz="1800" spc="-1" strike="noStrike">
+              <a:solidFill>
+                <a:srgbClr val="000000"/>
+              </a:solidFill>
+              <a:uFill>
+                <a:solidFill>
+                  <a:srgbClr val="ffffff"/>
+                </a:solidFill>
+              </a:uFill>
+              <a:latin typeface="Arial"/>
+            </a:endParaRPr>
+          </a:p>
+          <a:p>
+            <a:pPr marL="274320" indent="-273240">
               <a:lnSpc>
                 <a:spcPct val="120000"/>
               </a:lnSpc>
@@ -10784,20 +10821,20 @@
               </a:rPr>
               <a:t>非结构化文本数据。</a:t>
             </a:r>
-            <a:endParaRPr b="0" lang="en-US" sz="1600" spc="-1" strike="noStrike">
-              <a:solidFill>
-                <a:srgbClr val="000000"/>
-              </a:solidFill>
-              <a:uFill>
-                <a:solidFill>
-                  <a:srgbClr val="ffffff"/>
-                </a:solidFill>
-              </a:uFill>
-              <a:latin typeface="Arial"/>
-            </a:endParaRPr>
-          </a:p>
-          <a:p>
-            <a:pPr marL="274320" indent="-273600">
+            <a:endParaRPr b="0" lang="en-US" sz="1800" spc="-1" strike="noStrike">
+              <a:solidFill>
+                <a:srgbClr val="000000"/>
+              </a:solidFill>
+              <a:uFill>
+                <a:solidFill>
+                  <a:srgbClr val="ffffff"/>
+                </a:solidFill>
+              </a:uFill>
+              <a:latin typeface="Arial"/>
+            </a:endParaRPr>
+          </a:p>
+          <a:p>
+            <a:pPr marL="274320" indent="-273240">
               <a:lnSpc>
                 <a:spcPct val="120000"/>
               </a:lnSpc>
@@ -10823,20 +10860,20 @@
               </a:rPr>
               <a:t>半结构化的网页和表格。</a:t>
             </a:r>
-            <a:endParaRPr b="0" lang="en-US" sz="1600" spc="-1" strike="noStrike">
-              <a:solidFill>
-                <a:srgbClr val="000000"/>
-              </a:solidFill>
-              <a:uFill>
-                <a:solidFill>
-                  <a:srgbClr val="ffffff"/>
-                </a:solidFill>
-              </a:uFill>
-              <a:latin typeface="Arial"/>
-            </a:endParaRPr>
-          </a:p>
-          <a:p>
-            <a:pPr marL="274320" indent="-273600">
+            <a:endParaRPr b="0" lang="en-US" sz="1800" spc="-1" strike="noStrike">
+              <a:solidFill>
+                <a:srgbClr val="000000"/>
+              </a:solidFill>
+              <a:uFill>
+                <a:solidFill>
+                  <a:srgbClr val="ffffff"/>
+                </a:solidFill>
+              </a:uFill>
+              <a:latin typeface="Arial"/>
+            </a:endParaRPr>
+          </a:p>
+          <a:p>
+            <a:pPr marL="274320" indent="-273240">
               <a:lnSpc>
                 <a:spcPct val="120000"/>
               </a:lnSpc>
@@ -10862,7 +10899,7 @@
               </a:rPr>
               <a:t>结构化数据。</a:t>
             </a:r>
-            <a:endParaRPr b="0" lang="en-US" sz="1600" spc="-1" strike="noStrike">
+            <a:endParaRPr b="0" lang="en-US" sz="1800" spc="-1" strike="noStrike">
               <a:solidFill>
                 <a:srgbClr val="000000"/>
               </a:solidFill>
@@ -10880,7 +10917,7 @@
                 <a:spcPct val="100000"/>
               </a:lnSpc>
             </a:pPr>
-            <a:endParaRPr b="0" lang="en-US" sz="1600" spc="-1" strike="noStrike">
+            <a:endParaRPr b="0" lang="en-US" sz="1800" spc="-1" strike="noStrike">
               <a:solidFill>
                 <a:srgbClr val="000000"/>
               </a:solidFill>
@@ -10898,7 +10935,7 @@
                 <a:spcPct val="100000"/>
               </a:lnSpc>
             </a:pPr>
-            <a:endParaRPr b="0" lang="en-US" sz="1600" spc="-1" strike="noStrike">
+            <a:endParaRPr b="0" lang="en-US" sz="1800" spc="-1" strike="noStrike">
               <a:solidFill>
                 <a:srgbClr val="000000"/>
               </a:solidFill>
@@ -10946,20 +10983,20 @@
               </a:rPr>
               <a:t>基础性</a:t>
             </a:r>
-            <a:endParaRPr b="0" lang="en-US" sz="1600" spc="-1" strike="noStrike">
-              <a:solidFill>
-                <a:srgbClr val="000000"/>
-              </a:solidFill>
-              <a:uFill>
-                <a:solidFill>
-                  <a:srgbClr val="ffffff"/>
-                </a:solidFill>
-              </a:uFill>
-              <a:latin typeface="Arial"/>
-            </a:endParaRPr>
-          </a:p>
-          <a:p>
-            <a:pPr marL="274320" indent="-273600">
+            <a:endParaRPr b="0" lang="en-US" sz="1800" spc="-1" strike="noStrike">
+              <a:solidFill>
+                <a:srgbClr val="000000"/>
+              </a:solidFill>
+              <a:uFill>
+                <a:solidFill>
+                  <a:srgbClr val="ffffff"/>
+                </a:solidFill>
+              </a:uFill>
+              <a:latin typeface="Arial"/>
+            </a:endParaRPr>
+          </a:p>
+          <a:p>
+            <a:pPr marL="274320" indent="-273240">
               <a:lnSpc>
                 <a:spcPct val="120000"/>
               </a:lnSpc>
@@ -10985,20 +11022,20 @@
               </a:rPr>
               <a:t>构建知识图谱的基础之一是：如何获取领域知识。</a:t>
             </a:r>
-            <a:endParaRPr b="0" lang="en-US" sz="1600" spc="-1" strike="noStrike">
-              <a:solidFill>
-                <a:srgbClr val="000000"/>
-              </a:solidFill>
-              <a:uFill>
-                <a:solidFill>
-                  <a:srgbClr val="ffffff"/>
-                </a:solidFill>
-              </a:uFill>
-              <a:latin typeface="Arial"/>
-            </a:endParaRPr>
-          </a:p>
-          <a:p>
-            <a:pPr marL="274320" indent="-273600">
+            <a:endParaRPr b="0" lang="en-US" sz="1800" spc="-1" strike="noStrike">
+              <a:solidFill>
+                <a:srgbClr val="000000"/>
+              </a:solidFill>
+              <a:uFill>
+                <a:solidFill>
+                  <a:srgbClr val="ffffff"/>
+                </a:solidFill>
+              </a:uFill>
+              <a:latin typeface="Arial"/>
+            </a:endParaRPr>
+          </a:p>
+          <a:p>
+            <a:pPr marL="274320" indent="-273240">
               <a:lnSpc>
                 <a:spcPct val="120000"/>
               </a:lnSpc>
@@ -11054,20 +11091,20 @@
               </a:rPr>
               <a:t>中获取领域知识的重要方法。</a:t>
             </a:r>
-            <a:endParaRPr b="0" lang="en-US" sz="1600" spc="-1" strike="noStrike">
-              <a:solidFill>
-                <a:srgbClr val="000000"/>
-              </a:solidFill>
-              <a:uFill>
-                <a:solidFill>
-                  <a:srgbClr val="ffffff"/>
-                </a:solidFill>
-              </a:uFill>
-              <a:latin typeface="Arial"/>
-            </a:endParaRPr>
-          </a:p>
-          <a:p>
-            <a:pPr marL="274320" indent="-273600">
+            <a:endParaRPr b="0" lang="en-US" sz="1800" spc="-1" strike="noStrike">
+              <a:solidFill>
+                <a:srgbClr val="000000"/>
+              </a:solidFill>
+              <a:uFill>
+                <a:solidFill>
+                  <a:srgbClr val="ffffff"/>
+                </a:solidFill>
+              </a:uFill>
+              <a:latin typeface="Arial"/>
+            </a:endParaRPr>
+          </a:p>
+          <a:p>
+            <a:pPr marL="274320" indent="-273240">
               <a:lnSpc>
                 <a:spcPct val="120000"/>
               </a:lnSpc>
@@ -11093,7 +11130,7 @@
               </a:rPr>
               <a:t>应用：智能问答、自动摘要、信息检索、机器翻译、语义网络等。</a:t>
             </a:r>
-            <a:endParaRPr b="0" lang="en-US" sz="1600" spc="-1" strike="noStrike">
+            <a:endParaRPr b="0" lang="en-US" sz="1800" spc="-1" strike="noStrike">
               <a:solidFill>
                 <a:srgbClr val="000000"/>
               </a:solidFill>
@@ -11126,7 +11163,7 @@
               </a:rPr>
               <a:t>	</a:t>
             </a:r>
-            <a:endParaRPr b="0" lang="en-US" sz="1600" spc="-1" strike="noStrike">
+            <a:endParaRPr b="0" lang="en-US" sz="1800" spc="-1" strike="noStrike">
               <a:solidFill>
                 <a:srgbClr val="000000"/>
               </a:solidFill>
@@ -11234,7 +11271,7 @@
               </a:rPr>
               <a:t>     </a:t>
             </a:r>
-            <a:endParaRPr b="0" lang="en-US" sz="1600" spc="-1" strike="noStrike">
+            <a:endParaRPr b="0" lang="en-US" sz="1800" spc="-1" strike="noStrike">
               <a:solidFill>
                 <a:srgbClr val="000000"/>
               </a:solidFill>
@@ -11252,7 +11289,7 @@
                 <a:spcPct val="100000"/>
               </a:lnSpc>
             </a:pPr>
-            <a:endParaRPr b="0" lang="en-US" sz="1600" spc="-1" strike="noStrike">
+            <a:endParaRPr b="0" lang="en-US" sz="1800" spc="-1" strike="noStrike">
               <a:solidFill>
                 <a:srgbClr val="000000"/>
               </a:solidFill>
@@ -11270,7 +11307,7 @@
                 <a:spcPct val="100000"/>
               </a:lnSpc>
             </a:pPr>
-            <a:endParaRPr b="0" lang="en-US" sz="1600" spc="-1" strike="noStrike">
+            <a:endParaRPr b="0" lang="en-US" sz="1800" spc="-1" strike="noStrike">
               <a:solidFill>
                 <a:srgbClr val="000000"/>
               </a:solidFill>
@@ -11288,7 +11325,7 @@
                 <a:spcPct val="100000"/>
               </a:lnSpc>
             </a:pPr>
-            <a:endParaRPr b="0" lang="en-US" sz="1600" spc="-1" strike="noStrike">
+            <a:endParaRPr b="0" lang="en-US" sz="1800" spc="-1" strike="noStrike">
               <a:solidFill>
                 <a:srgbClr val="000000"/>
               </a:solidFill>
@@ -11306,7 +11343,7 @@
                 <a:spcPct val="100000"/>
               </a:lnSpc>
             </a:pPr>
-            <a:endParaRPr b="0" lang="en-US" sz="1600" spc="-1" strike="noStrike">
+            <a:endParaRPr b="0" lang="en-US" sz="1800" spc="-1" strike="noStrike">
               <a:solidFill>
                 <a:srgbClr val="000000"/>
               </a:solidFill>
@@ -11324,7 +11361,7 @@
                 <a:spcPct val="100000"/>
               </a:lnSpc>
             </a:pPr>
-            <a:endParaRPr b="0" lang="en-US" sz="1600" spc="-1" strike="noStrike">
+            <a:endParaRPr b="0" lang="en-US" sz="1800" spc="-1" strike="noStrike">
               <a:solidFill>
                 <a:srgbClr val="000000"/>
               </a:solidFill>
@@ -11342,7 +11379,7 @@
                 <a:spcPct val="100000"/>
               </a:lnSpc>
             </a:pPr>
-            <a:endParaRPr b="0" lang="en-US" sz="1600" spc="-1" strike="noStrike">
+            <a:endParaRPr b="0" lang="en-US" sz="1800" spc="-1" strike="noStrike">
               <a:solidFill>
                 <a:srgbClr val="000000"/>
               </a:solidFill>
@@ -11360,7 +11397,7 @@
                 <a:spcPct val="100000"/>
               </a:lnSpc>
             </a:pPr>
-            <a:endParaRPr b="0" lang="en-US" sz="1600" spc="-1" strike="noStrike">
+            <a:endParaRPr b="0" lang="en-US" sz="1800" spc="-1" strike="noStrike">
               <a:solidFill>
                 <a:srgbClr val="000000"/>
               </a:solidFill>
@@ -11378,7 +11415,7 @@
                 <a:spcPct val="100000"/>
               </a:lnSpc>
             </a:pPr>
-            <a:endParaRPr b="0" lang="en-US" sz="1600" spc="-1" strike="noStrike">
+            <a:endParaRPr b="0" lang="en-US" sz="1800" spc="-1" strike="noStrike">
               <a:solidFill>
                 <a:srgbClr val="000000"/>
               </a:solidFill>
@@ -11396,7 +11433,7 @@
                 <a:spcPct val="100000"/>
               </a:lnSpc>
             </a:pPr>
-            <a:endParaRPr b="0" lang="en-US" sz="1600" spc="-1" strike="noStrike">
+            <a:endParaRPr b="0" lang="en-US" sz="1800" spc="-1" strike="noStrike">
               <a:solidFill>
                 <a:srgbClr val="000000"/>
               </a:solidFill>
@@ -11414,7 +11451,7 @@
                 <a:spcPct val="100000"/>
               </a:lnSpc>
             </a:pPr>
-            <a:endParaRPr b="0" lang="en-US" sz="1600" spc="-1" strike="noStrike">
+            <a:endParaRPr b="0" lang="en-US" sz="1800" spc="-1" strike="noStrike">
               <a:solidFill>
                 <a:srgbClr val="000000"/>
               </a:solidFill>
@@ -11432,7 +11469,7 @@
                 <a:spcPct val="100000"/>
               </a:lnSpc>
             </a:pPr>
-            <a:endParaRPr b="0" lang="en-US" sz="1600" spc="-1" strike="noStrike">
+            <a:endParaRPr b="0" lang="en-US" sz="1800" spc="-1" strike="noStrike">
               <a:solidFill>
                 <a:srgbClr val="000000"/>
               </a:solidFill>
@@ -11450,7 +11487,7 @@
                 <a:spcPct val="100000"/>
               </a:lnSpc>
             </a:pPr>
-            <a:endParaRPr b="0" lang="en-US" sz="1600" spc="-1" strike="noStrike">
+            <a:endParaRPr b="0" lang="en-US" sz="1800" spc="-1" strike="noStrike">
               <a:solidFill>
                 <a:srgbClr val="000000"/>
               </a:solidFill>
@@ -11483,7 +11520,7 @@
               </a:rPr>
               <a:t>	</a:t>
             </a:r>
-            <a:endParaRPr b="0" lang="en-US" sz="1600" spc="-1" strike="noStrike">
+            <a:endParaRPr b="0" lang="en-US" sz="1800" spc="-1" strike="noStrike">
               <a:solidFill>
                 <a:srgbClr val="000000"/>
               </a:solidFill>
@@ -11499,14 +11536,14 @@
       </p:sp>
       <p:sp>
         <p:nvSpPr>
-          <p:cNvPr id="98" name="CustomShape 4"/>
+          <p:cNvPr id="99" name="CustomShape 4"/>
           <p:cNvSpPr/>
           <p:nvPr/>
         </p:nvSpPr>
         <p:spPr>
           <a:xfrm>
             <a:off x="1115640" y="2493000"/>
-            <a:ext cx="6336000" cy="431280"/>
+            <a:ext cx="6335640" cy="430920"/>
           </a:xfrm>
           <a:prstGeom prst="rect">
             <a:avLst/>
@@ -11574,14 +11611,14 @@
       </p:grpSpPr>
       <p:sp>
         <p:nvSpPr>
-          <p:cNvPr id="99" name="CustomShape 1"/>
+          <p:cNvPr id="100" name="CustomShape 1"/>
           <p:cNvSpPr/>
           <p:nvPr/>
         </p:nvSpPr>
         <p:spPr>
           <a:xfrm>
             <a:off x="323640" y="116640"/>
-            <a:ext cx="8152560" cy="990000"/>
+            <a:ext cx="8152200" cy="989640"/>
           </a:xfrm>
           <a:prstGeom prst="rect">
             <a:avLst/>
@@ -11636,14 +11673,14 @@
       </p:sp>
       <p:sp>
         <p:nvSpPr>
-          <p:cNvPr id="100" name="CustomShape 2"/>
+          <p:cNvPr id="101" name="CustomShape 2"/>
           <p:cNvSpPr/>
           <p:nvPr/>
         </p:nvSpPr>
         <p:spPr>
           <a:xfrm>
             <a:off x="612720" y="6375600"/>
-            <a:ext cx="1980360" cy="365040"/>
+            <a:ext cx="1980000" cy="364680"/>
           </a:xfrm>
           <a:prstGeom prst="rect">
             <a:avLst/>
@@ -11667,7 +11704,7 @@
                 <a:spcPct val="100000"/>
               </a:lnSpc>
             </a:pPr>
-            <a:fld id="{CACD74A4-1D06-4483-98E3-3485F8789A57}" type="slidenum">
+            <a:fld id="{90A69895-5581-49C0-8D36-8DBDF3D70248}" type="slidenum">
               <a:rPr b="1" lang="en-US" sz="1400" spc="-1" strike="noStrike">
                 <a:solidFill>
                   <a:srgbClr val="464653"/>
@@ -11698,14 +11735,14 @@
       </p:sp>
       <p:sp>
         <p:nvSpPr>
-          <p:cNvPr id="101" name="CustomShape 3"/>
+          <p:cNvPr id="102" name="CustomShape 3"/>
           <p:cNvSpPr/>
           <p:nvPr/>
         </p:nvSpPr>
         <p:spPr>
           <a:xfrm>
             <a:off x="1115640" y="2493000"/>
-            <a:ext cx="6336000" cy="431280"/>
+            <a:ext cx="6335640" cy="430920"/>
           </a:xfrm>
           <a:prstGeom prst="rect">
             <a:avLst/>
@@ -11724,7 +11761,7 @@
       </p:sp>
       <p:pic>
         <p:nvPicPr>
-          <p:cNvPr id="102" name="Picture 2" descr=""/>
+          <p:cNvPr id="103" name="Picture 2" descr=""/>
           <p:cNvPicPr/>
           <p:nvPr/>
         </p:nvPicPr>
@@ -11735,7 +11772,7 @@
         <p:spPr>
           <a:xfrm>
             <a:off x="1043640" y="1664640"/>
-            <a:ext cx="7560000" cy="3527640"/>
+            <a:ext cx="7559640" cy="3527280"/>
           </a:xfrm>
           <a:prstGeom prst="rect">
             <a:avLst/>
@@ -11747,14 +11784,14 @@
       </p:pic>
       <p:sp>
         <p:nvSpPr>
-          <p:cNvPr id="103" name="CustomShape 4"/>
+          <p:cNvPr id="104" name="CustomShape 4"/>
           <p:cNvSpPr/>
           <p:nvPr/>
         </p:nvSpPr>
         <p:spPr>
           <a:xfrm>
             <a:off x="2123640" y="2925000"/>
-            <a:ext cx="1583280" cy="827280"/>
+            <a:ext cx="1582920" cy="826920"/>
           </a:xfrm>
           <a:prstGeom prst="roundRect">
             <a:avLst>
@@ -11786,14 +11823,14 @@
       </p:sp>
       <p:sp>
         <p:nvSpPr>
-          <p:cNvPr id="104" name="CustomShape 5"/>
+          <p:cNvPr id="105" name="CustomShape 5"/>
           <p:cNvSpPr/>
           <p:nvPr/>
         </p:nvSpPr>
         <p:spPr>
           <a:xfrm rot="19884000">
-            <a:off x="1459440" y="3654360"/>
-            <a:ext cx="977760" cy="483840"/>
+            <a:off x="1459080" y="3654360"/>
+            <a:ext cx="977400" cy="483480"/>
           </a:xfrm>
           <a:prstGeom prst="rightArrow">
             <a:avLst>
@@ -11874,14 +11911,14 @@
       </p:grpSpPr>
       <p:sp>
         <p:nvSpPr>
-          <p:cNvPr id="105" name="CustomShape 1"/>
+          <p:cNvPr id="106" name="CustomShape 1"/>
           <p:cNvSpPr/>
           <p:nvPr/>
         </p:nvSpPr>
         <p:spPr>
           <a:xfrm>
             <a:off x="323640" y="116640"/>
-            <a:ext cx="8152560" cy="990000"/>
+            <a:ext cx="8152200" cy="989640"/>
           </a:xfrm>
           <a:prstGeom prst="rect">
             <a:avLst/>
@@ -11936,14 +11973,14 @@
       </p:sp>
       <p:sp>
         <p:nvSpPr>
-          <p:cNvPr id="106" name="CustomShape 2"/>
+          <p:cNvPr id="107" name="CustomShape 2"/>
           <p:cNvSpPr/>
           <p:nvPr/>
         </p:nvSpPr>
         <p:spPr>
           <a:xfrm>
             <a:off x="612720" y="6375600"/>
-            <a:ext cx="1980360" cy="365040"/>
+            <a:ext cx="1980000" cy="364680"/>
           </a:xfrm>
           <a:prstGeom prst="rect">
             <a:avLst/>
@@ -11967,7 +12004,7 @@
                 <a:spcPct val="100000"/>
               </a:lnSpc>
             </a:pPr>
-            <a:fld id="{8FA9FB0B-1645-4DBE-AF97-88E155085AC5}" type="slidenum">
+            <a:fld id="{5D65D3E0-B858-4A66-A438-CBC559BFEF55}" type="slidenum">
               <a:rPr b="1" lang="en-US" sz="1400" spc="-1" strike="noStrike">
                 <a:solidFill>
                   <a:srgbClr val="464653"/>
@@ -11998,14 +12035,14 @@
       </p:sp>
       <p:sp>
         <p:nvSpPr>
-          <p:cNvPr id="107" name="CustomShape 3"/>
+          <p:cNvPr id="108" name="CustomShape 3"/>
           <p:cNvSpPr/>
           <p:nvPr/>
         </p:nvSpPr>
         <p:spPr>
           <a:xfrm>
             <a:off x="1115640" y="2493000"/>
-            <a:ext cx="6336000" cy="431280"/>
+            <a:ext cx="6335640" cy="430920"/>
           </a:xfrm>
           <a:prstGeom prst="rect">
             <a:avLst/>
@@ -12024,7 +12061,7 @@
       </p:sp>
       <p:pic>
         <p:nvPicPr>
-          <p:cNvPr id="108" name="图片 9" descr=""/>
+          <p:cNvPr id="109" name="图片 9" descr=""/>
           <p:cNvPicPr/>
           <p:nvPr/>
         </p:nvPicPr>
@@ -12035,7 +12072,7 @@
         <p:spPr>
           <a:xfrm>
             <a:off x="2355840" y="1635480"/>
-            <a:ext cx="4688280" cy="2967840"/>
+            <a:ext cx="4687920" cy="2967480"/>
           </a:xfrm>
           <a:prstGeom prst="rect">
             <a:avLst/>
@@ -12050,14 +12087,14 @@
       </p:pic>
       <p:sp>
         <p:nvSpPr>
-          <p:cNvPr id="109" name="CustomShape 4"/>
+          <p:cNvPr id="110" name="CustomShape 4"/>
           <p:cNvSpPr/>
           <p:nvPr/>
         </p:nvSpPr>
         <p:spPr>
           <a:xfrm>
             <a:off x="179640" y="1270800"/>
-            <a:ext cx="1799640" cy="942480"/>
+            <a:ext cx="1799280" cy="942120"/>
           </a:xfrm>
           <a:prstGeom prst="rect">
             <a:avLst/>
@@ -12076,7 +12113,7 @@
         <p:txBody>
           <a:bodyPr lIns="90000" rIns="90000" tIns="45000" bIns="45000"/>
           <a:p>
-            <a:pPr lvl="1" marL="457200" indent="-215640">
+            <a:pPr lvl="1" marL="457200" indent="-215280">
               <a:lnSpc>
                 <a:spcPct val="100000"/>
               </a:lnSpc>
@@ -12117,14 +12154,14 @@
       </p:sp>
       <p:sp>
         <p:nvSpPr>
-          <p:cNvPr id="110" name="CustomShape 5"/>
+          <p:cNvPr id="111" name="CustomShape 5"/>
           <p:cNvSpPr/>
           <p:nvPr/>
         </p:nvSpPr>
         <p:spPr>
           <a:xfrm>
             <a:off x="623520" y="5063760"/>
-            <a:ext cx="8152560" cy="942480"/>
+            <a:ext cx="8152200" cy="942120"/>
           </a:xfrm>
           <a:prstGeom prst="rect">
             <a:avLst/>
@@ -12228,14 +12265,14 @@
       </p:grpSpPr>
       <p:sp>
         <p:nvSpPr>
-          <p:cNvPr id="111" name="CustomShape 1"/>
+          <p:cNvPr id="112" name="CustomShape 1"/>
           <p:cNvSpPr/>
           <p:nvPr/>
         </p:nvSpPr>
         <p:spPr>
           <a:xfrm>
             <a:off x="457200" y="152280"/>
-            <a:ext cx="8228880" cy="990000"/>
+            <a:ext cx="8228520" cy="989640"/>
           </a:xfrm>
           <a:prstGeom prst="rect">
             <a:avLst/>
@@ -12270,6 +12307,7 @@
                   </a:solidFill>
                 </a:uFill>
                 <a:latin typeface="Arial"/>
+                <a:ea typeface="DejaVu Sans"/>
               </a:rPr>
               <a:t>二、实体识别</a:t>
             </a:r>
@@ -12289,14 +12327,14 @@
       </p:sp>
       <p:sp>
         <p:nvSpPr>
-          <p:cNvPr id="112" name="CustomShape 2"/>
+          <p:cNvPr id="113" name="CustomShape 2"/>
           <p:cNvSpPr/>
           <p:nvPr/>
         </p:nvSpPr>
         <p:spPr>
           <a:xfrm>
             <a:off x="612720" y="6356520"/>
-            <a:ext cx="1980360" cy="365040"/>
+            <a:ext cx="1980000" cy="364680"/>
           </a:xfrm>
           <a:prstGeom prst="rect">
             <a:avLst/>
@@ -12320,7 +12358,7 @@
                 <a:spcPct val="100000"/>
               </a:lnSpc>
             </a:pPr>
-            <a:fld id="{6ABC4441-A33E-4789-A294-74AAB2C42CE2}" type="slidenum">
+            <a:fld id="{5A6ACD56-B5DA-4037-B1B3-96D6813A7FB0}" type="slidenum">
               <a:rPr b="1" lang="en-US" sz="1400" spc="-1" strike="noStrike">
                 <a:solidFill>
                   <a:srgbClr val="464653"/>
@@ -12351,14 +12389,14 @@
       </p:sp>
       <p:sp>
         <p:nvSpPr>
-          <p:cNvPr id="113" name="CustomShape 3"/>
+          <p:cNvPr id="114" name="CustomShape 3"/>
           <p:cNvSpPr/>
           <p:nvPr/>
         </p:nvSpPr>
         <p:spPr>
           <a:xfrm>
             <a:off x="457200" y="1124640"/>
-            <a:ext cx="8228880" cy="4937040"/>
+            <a:ext cx="8228520" cy="4936680"/>
           </a:xfrm>
           <a:prstGeom prst="rect">
             <a:avLst/>
@@ -12377,7 +12415,7 @@
         <p:txBody>
           <a:bodyPr lIns="90000" rIns="90000" tIns="45000" bIns="45000"/>
           <a:p>
-            <a:pPr marL="274320" indent="-273600">
+            <a:pPr marL="274320" indent="-273240">
               <a:lnSpc>
                 <a:spcPct val="100000"/>
               </a:lnSpc>
@@ -12399,6 +12437,7 @@
                   </a:solidFill>
                 </a:uFill>
                 <a:latin typeface="Gill Sans MT"/>
+                <a:ea typeface="DejaVu Sans"/>
               </a:rPr>
               <a:t>今晚的维也纳，犹如一周之前的英国利物浦，再次见</a:t>
             </a:r>
@@ -12467,6 +12506,7 @@
                   </a:solidFill>
                 </a:uFill>
                 <a:latin typeface="Gill Sans MT"/>
+                <a:ea typeface="DejaVu Sans"/>
               </a:rPr>
               <a:t>证了内马尔的超级发挥！</a:t>
             </a:r>
@@ -12519,7 +12559,7 @@
             </a:endParaRPr>
           </a:p>
           <a:p>
-            <a:pPr marL="274320" indent="-273600">
+            <a:pPr marL="274320" indent="-273240">
               <a:lnSpc>
                 <a:spcPct val="100000"/>
               </a:lnSpc>
@@ -12541,6 +12581,7 @@
                   </a:solidFill>
                 </a:uFill>
                 <a:latin typeface="Gill Sans MT"/>
+                <a:ea typeface="DejaVu Sans"/>
               </a:rPr>
               <a:t>技术框架</a:t>
             </a:r>
@@ -12555,6 +12596,7 @@
                   </a:solidFill>
                 </a:uFill>
                 <a:latin typeface="Gill Sans MT"/>
+                <a:ea typeface="DejaVu Sans"/>
               </a:rPr>
               <a:t>---</a:t>
             </a:r>
@@ -12569,6 +12611,7 @@
                   </a:solidFill>
                 </a:uFill>
                 <a:latin typeface="Gill Sans MT"/>
+                <a:ea typeface="DejaVu Sans"/>
               </a:rPr>
               <a:t>基于特征向量的学习算法</a:t>
             </a:r>
@@ -12606,14 +12649,14 @@
       </p:sp>
       <p:sp>
         <p:nvSpPr>
-          <p:cNvPr id="114" name="CustomShape 4"/>
+          <p:cNvPr id="115" name="CustomShape 4"/>
           <p:cNvSpPr/>
           <p:nvPr/>
         </p:nvSpPr>
         <p:spPr>
           <a:xfrm>
             <a:off x="1204920" y="2607120"/>
-            <a:ext cx="1007280" cy="387360"/>
+            <a:ext cx="1006920" cy="387000"/>
           </a:xfrm>
           <a:prstGeom prst="rect">
             <a:avLst/>
@@ -12643,14 +12686,14 @@
       </p:sp>
       <p:sp>
         <p:nvSpPr>
-          <p:cNvPr id="115" name="CustomShape 5"/>
+          <p:cNvPr id="116" name="CustomShape 5"/>
           <p:cNvSpPr/>
           <p:nvPr/>
         </p:nvSpPr>
         <p:spPr>
           <a:xfrm>
             <a:off x="5508000" y="1219320"/>
-            <a:ext cx="1655640" cy="408960"/>
+            <a:ext cx="1655280" cy="408600"/>
           </a:xfrm>
           <a:prstGeom prst="rect">
             <a:avLst/>
@@ -12680,14 +12723,14 @@
       </p:sp>
       <p:sp>
         <p:nvSpPr>
-          <p:cNvPr id="116" name="CustomShape 6"/>
+          <p:cNvPr id="117" name="CustomShape 6"/>
           <p:cNvSpPr/>
           <p:nvPr/>
         </p:nvSpPr>
         <p:spPr>
           <a:xfrm>
             <a:off x="1835640" y="1196640"/>
-            <a:ext cx="1007280" cy="387360"/>
+            <a:ext cx="1006920" cy="387000"/>
           </a:xfrm>
           <a:prstGeom prst="rect">
             <a:avLst/>
@@ -12717,14 +12760,14 @@
       </p:sp>
       <p:sp>
         <p:nvSpPr>
-          <p:cNvPr id="117" name="CustomShape 7"/>
+          <p:cNvPr id="118" name="CustomShape 7"/>
           <p:cNvSpPr/>
           <p:nvPr/>
         </p:nvSpPr>
         <p:spPr>
           <a:xfrm>
             <a:off x="1722600" y="2984040"/>
-            <a:ext cx="360" cy="436680"/>
+            <a:ext cx="360" cy="436320"/>
           </a:xfrm>
           <a:custGeom>
             <a:avLst/>
@@ -12766,14 +12809,14 @@
       </p:sp>
       <p:sp>
         <p:nvSpPr>
-          <p:cNvPr id="118" name="CustomShape 8"/>
+          <p:cNvPr id="119" name="CustomShape 8"/>
           <p:cNvSpPr/>
           <p:nvPr/>
         </p:nvSpPr>
         <p:spPr>
           <a:xfrm>
             <a:off x="1187640" y="3421440"/>
-            <a:ext cx="1108080" cy="368640"/>
+            <a:ext cx="1107720" cy="368280"/>
           </a:xfrm>
           <a:prstGeom prst="rect">
             <a:avLst/>
@@ -12803,14 +12846,14 @@
       </p:sp>
       <p:sp>
         <p:nvSpPr>
-          <p:cNvPr id="119" name="CustomShape 9"/>
+          <p:cNvPr id="120" name="CustomShape 9"/>
           <p:cNvSpPr/>
           <p:nvPr/>
         </p:nvSpPr>
         <p:spPr>
           <a:xfrm>
             <a:off x="1382040" y="3421440"/>
-            <a:ext cx="719280" cy="364320"/>
+            <a:ext cx="718920" cy="363960"/>
           </a:xfrm>
           <a:prstGeom prst="rect">
             <a:avLst/>
@@ -12865,14 +12908,14 @@
       </p:sp>
       <p:sp>
         <p:nvSpPr>
-          <p:cNvPr id="120" name="CustomShape 10"/>
+          <p:cNvPr id="121" name="CustomShape 10"/>
           <p:cNvSpPr/>
           <p:nvPr/>
         </p:nvSpPr>
         <p:spPr>
           <a:xfrm>
             <a:off x="2194200" y="1584720"/>
-            <a:ext cx="290880" cy="408960"/>
+            <a:ext cx="290520" cy="408600"/>
           </a:xfrm>
           <a:prstGeom prst="downArrow">
             <a:avLst>
@@ -12907,14 +12950,14 @@
       </p:sp>
       <p:sp>
         <p:nvSpPr>
-          <p:cNvPr id="121" name="CustomShape 11"/>
+          <p:cNvPr id="122" name="CustomShape 11"/>
           <p:cNvSpPr/>
           <p:nvPr/>
         </p:nvSpPr>
         <p:spPr>
           <a:xfrm>
             <a:off x="6190560" y="1628640"/>
-            <a:ext cx="290880" cy="387360"/>
+            <a:ext cx="290520" cy="387000"/>
           </a:xfrm>
           <a:prstGeom prst="downArrow">
             <a:avLst>
@@ -12949,14 +12992,14 @@
       </p:sp>
       <p:sp>
         <p:nvSpPr>
-          <p:cNvPr id="122" name="CustomShape 12"/>
+          <p:cNvPr id="123" name="CustomShape 12"/>
           <p:cNvSpPr/>
           <p:nvPr/>
         </p:nvSpPr>
         <p:spPr>
           <a:xfrm>
             <a:off x="1835640" y="1972800"/>
-            <a:ext cx="1108080" cy="387360"/>
+            <a:ext cx="1107720" cy="387000"/>
           </a:xfrm>
           <a:prstGeom prst="rect">
             <a:avLst/>
@@ -12986,14 +13029,14 @@
       </p:sp>
       <p:sp>
         <p:nvSpPr>
-          <p:cNvPr id="123" name="CustomShape 13"/>
+          <p:cNvPr id="124" name="CustomShape 13"/>
           <p:cNvSpPr/>
           <p:nvPr/>
         </p:nvSpPr>
         <p:spPr>
           <a:xfrm>
             <a:off x="2071440" y="1978200"/>
-            <a:ext cx="663840" cy="364320"/>
+            <a:ext cx="663480" cy="363960"/>
           </a:xfrm>
           <a:prstGeom prst="rect">
             <a:avLst/>
@@ -13048,14 +13091,14 @@
       </p:sp>
       <p:sp>
         <p:nvSpPr>
-          <p:cNvPr id="124" name="CustomShape 14"/>
+          <p:cNvPr id="125" name="CustomShape 14"/>
           <p:cNvSpPr/>
           <p:nvPr/>
         </p:nvSpPr>
         <p:spPr>
           <a:xfrm>
             <a:off x="5781960" y="1978200"/>
-            <a:ext cx="1108080" cy="387360"/>
+            <a:ext cx="1107720" cy="387000"/>
           </a:xfrm>
           <a:prstGeom prst="rect">
             <a:avLst/>
@@ -13085,14 +13128,14 @@
       </p:sp>
       <p:sp>
         <p:nvSpPr>
-          <p:cNvPr id="125" name="CustomShape 15"/>
+          <p:cNvPr id="126" name="CustomShape 15"/>
           <p:cNvSpPr/>
           <p:nvPr/>
         </p:nvSpPr>
         <p:spPr>
           <a:xfrm>
             <a:off x="6087600" y="1998360"/>
-            <a:ext cx="663840" cy="364320"/>
+            <a:ext cx="663480" cy="363960"/>
           </a:xfrm>
           <a:prstGeom prst="rect">
             <a:avLst/>
@@ -13147,14 +13190,14 @@
       </p:sp>
       <p:sp>
         <p:nvSpPr>
-          <p:cNvPr id="126" name="CustomShape 16"/>
+          <p:cNvPr id="127" name="CustomShape 16"/>
           <p:cNvSpPr/>
           <p:nvPr/>
         </p:nvSpPr>
         <p:spPr>
           <a:xfrm>
             <a:off x="1072800" y="4762800"/>
-            <a:ext cx="600840" cy="1052640"/>
+            <a:ext cx="600480" cy="1052280"/>
           </a:xfrm>
           <a:prstGeom prst="can">
             <a:avLst>
@@ -13178,7 +13221,7 @@
           <a:fontRef idx="minor"/>
         </p:style>
         <p:txBody>
-          <a:bodyPr lIns="45000" rIns="45000" tIns="90000" bIns="90000" anchor="ctr" vert="vert"/>
+          <a:bodyPr lIns="90000" rIns="90000" tIns="45000" bIns="45000" anchor="ctr" vert="vert"/>
           <a:p>
             <a:pPr algn="ctr">
               <a:lnSpc>
@@ -13216,14 +13259,14 @@
       </p:sp>
       <p:sp>
         <p:nvSpPr>
-          <p:cNvPr id="127" name="CustomShape 17"/>
+          <p:cNvPr id="128" name="CustomShape 17"/>
           <p:cNvSpPr/>
           <p:nvPr/>
         </p:nvSpPr>
         <p:spPr>
           <a:xfrm>
             <a:off x="1685160" y="5104800"/>
-            <a:ext cx="810360" cy="368640"/>
+            <a:ext cx="810000" cy="368280"/>
           </a:xfrm>
           <a:prstGeom prst="rightArrow">
             <a:avLst>
@@ -13256,14 +13299,14 @@
       </p:sp>
       <p:sp>
         <p:nvSpPr>
-          <p:cNvPr id="128" name="CustomShape 18"/>
+          <p:cNvPr id="129" name="CustomShape 18"/>
           <p:cNvSpPr/>
           <p:nvPr/>
         </p:nvSpPr>
         <p:spPr>
           <a:xfrm>
             <a:off x="2496240" y="4781160"/>
-            <a:ext cx="922680" cy="913680"/>
+            <a:ext cx="922320" cy="913320"/>
           </a:xfrm>
           <a:prstGeom prst="rect">
             <a:avLst/>
@@ -13323,14 +13366,14 @@
       </p:sp>
       <p:sp>
         <p:nvSpPr>
-          <p:cNvPr id="129" name="CustomShape 19"/>
+          <p:cNvPr id="130" name="CustomShape 19"/>
           <p:cNvSpPr/>
           <p:nvPr/>
         </p:nvSpPr>
         <p:spPr>
           <a:xfrm>
             <a:off x="4248000" y="4724280"/>
-            <a:ext cx="1511280" cy="913680"/>
+            <a:ext cx="1510920" cy="913320"/>
           </a:xfrm>
           <a:prstGeom prst="ellipse">
             <a:avLst/>
@@ -13393,14 +13436,14 @@
       </p:sp>
       <p:sp>
         <p:nvSpPr>
-          <p:cNvPr id="130" name="CustomShape 20"/>
+          <p:cNvPr id="131" name="CustomShape 20"/>
           <p:cNvSpPr/>
           <p:nvPr/>
         </p:nvSpPr>
         <p:spPr>
           <a:xfrm>
             <a:off x="3430800" y="5053680"/>
-            <a:ext cx="810360" cy="368640"/>
+            <a:ext cx="810000" cy="368280"/>
           </a:xfrm>
           <a:prstGeom prst="rightArrow">
             <a:avLst>
@@ -13433,14 +13476,14 @@
       </p:sp>
       <p:sp>
         <p:nvSpPr>
-          <p:cNvPr id="131" name="CustomShape 21"/>
+          <p:cNvPr id="132" name="CustomShape 21"/>
           <p:cNvSpPr/>
           <p:nvPr/>
         </p:nvSpPr>
         <p:spPr>
           <a:xfrm>
             <a:off x="5784840" y="5004000"/>
-            <a:ext cx="810360" cy="368640"/>
+            <a:ext cx="810000" cy="368280"/>
           </a:xfrm>
           <a:prstGeom prst="rightArrow">
             <a:avLst>
@@ -13473,14 +13516,14 @@
       </p:sp>
       <p:sp>
         <p:nvSpPr>
-          <p:cNvPr id="132" name="CustomShape 22"/>
+          <p:cNvPr id="133" name="CustomShape 22"/>
           <p:cNvSpPr/>
           <p:nvPr/>
         </p:nvSpPr>
         <p:spPr>
           <a:xfrm>
             <a:off x="6612480" y="4860720"/>
-            <a:ext cx="1419480" cy="777240"/>
+            <a:ext cx="1419120" cy="776880"/>
           </a:xfrm>
           <a:prstGeom prst="rect">
             <a:avLst/>
@@ -13658,14 +13701,14 @@
       </p:grpSpPr>
       <p:sp>
         <p:nvSpPr>
-          <p:cNvPr id="133" name="CustomShape 1"/>
+          <p:cNvPr id="134" name="CustomShape 1"/>
           <p:cNvSpPr/>
           <p:nvPr/>
         </p:nvSpPr>
         <p:spPr>
           <a:xfrm>
             <a:off x="323640" y="135000"/>
-            <a:ext cx="8228880" cy="990000"/>
+            <a:ext cx="8228520" cy="989640"/>
           </a:xfrm>
           <a:prstGeom prst="rect">
             <a:avLst/>
@@ -13700,6 +13743,7 @@
                   </a:solidFill>
                 </a:uFill>
                 <a:latin typeface="Arial"/>
+                <a:ea typeface="DejaVu Sans"/>
               </a:rPr>
               <a:t>三、关系提取</a:t>
             </a:r>
@@ -13719,14 +13763,14 @@
       </p:sp>
       <p:sp>
         <p:nvSpPr>
-          <p:cNvPr id="134" name="CustomShape 2"/>
+          <p:cNvPr id="135" name="CustomShape 2"/>
           <p:cNvSpPr/>
           <p:nvPr/>
         </p:nvSpPr>
         <p:spPr>
           <a:xfrm>
             <a:off x="612720" y="6375600"/>
-            <a:ext cx="1980360" cy="365040"/>
+            <a:ext cx="1980000" cy="364680"/>
           </a:xfrm>
           <a:prstGeom prst="rect">
             <a:avLst/>
@@ -13750,7 +13794,7 @@
                 <a:spcPct val="100000"/>
               </a:lnSpc>
             </a:pPr>
-            <a:fld id="{9EA2E6EF-D7F8-463B-B06E-461A78022148}" type="slidenum">
+            <a:fld id="{4FB840B6-ADEE-4834-94DE-64D2C23AAB31}" type="slidenum">
               <a:rPr b="1" lang="en-US" sz="1400" spc="-1" strike="noStrike">
                 <a:solidFill>
                   <a:srgbClr val="464653"/>
@@ -13781,14 +13825,14 @@
       </p:sp>
       <p:sp>
         <p:nvSpPr>
-          <p:cNvPr id="135" name="CustomShape 3"/>
+          <p:cNvPr id="136" name="CustomShape 3"/>
           <p:cNvSpPr/>
           <p:nvPr/>
         </p:nvSpPr>
         <p:spPr>
           <a:xfrm>
             <a:off x="1284120" y="4753080"/>
-            <a:ext cx="6887520" cy="699120"/>
+            <a:ext cx="6887160" cy="698760"/>
           </a:xfrm>
           <a:prstGeom prst="rect">
             <a:avLst/>
@@ -13963,7 +14007,7 @@
       </p:sp>
       <p:pic>
         <p:nvPicPr>
-          <p:cNvPr id="136" name="图片 6" descr=""/>
+          <p:cNvPr id="137" name="图片 6" descr=""/>
           <p:cNvPicPr/>
           <p:nvPr/>
         </p:nvPicPr>
@@ -13974,7 +14018,7 @@
         <p:spPr>
           <a:xfrm>
             <a:off x="2339640" y="1473840"/>
-            <a:ext cx="4679640" cy="2962440"/>
+            <a:ext cx="4679280" cy="2962080"/>
           </a:xfrm>
           <a:prstGeom prst="rect">
             <a:avLst/>
@@ -13989,14 +14033,14 @@
       </p:pic>
       <p:sp>
         <p:nvSpPr>
-          <p:cNvPr id="137" name="CustomShape 4"/>
+          <p:cNvPr id="138" name="CustomShape 4"/>
           <p:cNvSpPr/>
           <p:nvPr/>
         </p:nvSpPr>
         <p:spPr>
           <a:xfrm>
             <a:off x="2411640" y="1484280"/>
-            <a:ext cx="3455640" cy="750600"/>
+            <a:ext cx="3455280" cy="750240"/>
           </a:xfrm>
           <a:prstGeom prst="rect">
             <a:avLst/>
@@ -14024,14 +14068,14 @@
       </p:sp>
       <p:sp>
         <p:nvSpPr>
-          <p:cNvPr id="138" name="CustomShape 5"/>
+          <p:cNvPr id="139" name="CustomShape 5"/>
           <p:cNvSpPr/>
           <p:nvPr/>
         </p:nvSpPr>
         <p:spPr>
           <a:xfrm>
             <a:off x="3132000" y="1700280"/>
-            <a:ext cx="647280" cy="359280"/>
+            <a:ext cx="646920" cy="358920"/>
           </a:xfrm>
           <a:prstGeom prst="rect">
             <a:avLst/>
@@ -14061,14 +14105,14 @@
       </p:sp>
       <p:sp>
         <p:nvSpPr>
-          <p:cNvPr id="139" name="CustomShape 6"/>
+          <p:cNvPr id="140" name="CustomShape 6"/>
           <p:cNvSpPr/>
           <p:nvPr/>
         </p:nvSpPr>
         <p:spPr>
           <a:xfrm>
             <a:off x="4416480" y="1679760"/>
-            <a:ext cx="647280" cy="359280"/>
+            <a:ext cx="646920" cy="358920"/>
           </a:xfrm>
           <a:prstGeom prst="rect">
             <a:avLst/>
@@ -14147,14 +14191,14 @@
       </p:grpSpPr>
       <p:sp>
         <p:nvSpPr>
-          <p:cNvPr id="140" name="CustomShape 1"/>
+          <p:cNvPr id="141" name="CustomShape 1"/>
           <p:cNvSpPr/>
           <p:nvPr/>
         </p:nvSpPr>
         <p:spPr>
           <a:xfrm>
             <a:off x="283680" y="159840"/>
-            <a:ext cx="8228880" cy="990000"/>
+            <a:ext cx="8228520" cy="989640"/>
           </a:xfrm>
           <a:prstGeom prst="rect">
             <a:avLst/>
@@ -14189,6 +14233,7 @@
                   </a:solidFill>
                 </a:uFill>
                 <a:latin typeface="Arial"/>
+                <a:ea typeface="DejaVu Sans"/>
               </a:rPr>
               <a:t>关系提取</a:t>
             </a:r>
@@ -14208,14 +14253,14 @@
       </p:sp>
       <p:sp>
         <p:nvSpPr>
-          <p:cNvPr id="141" name="CustomShape 2"/>
+          <p:cNvPr id="142" name="CustomShape 2"/>
           <p:cNvSpPr/>
           <p:nvPr/>
         </p:nvSpPr>
         <p:spPr>
           <a:xfrm>
             <a:off x="612720" y="6375600"/>
-            <a:ext cx="1980360" cy="365040"/>
+            <a:ext cx="1980000" cy="364680"/>
           </a:xfrm>
           <a:prstGeom prst="rect">
             <a:avLst/>
@@ -14239,7 +14284,7 @@
                 <a:spcPct val="100000"/>
               </a:lnSpc>
             </a:pPr>
-            <a:fld id="{BE7797E0-FE07-48A7-8EC7-75CC53CFC09C}" type="slidenum">
+            <a:fld id="{F10A87C5-F308-49F1-96FC-27D7EDD7F750}" type="slidenum">
               <a:rPr b="1" lang="en-US" sz="1400" spc="-1" strike="noStrike">
                 <a:solidFill>
                   <a:srgbClr val="464653"/>
@@ -14270,14 +14315,14 @@
       </p:sp>
       <p:sp>
         <p:nvSpPr>
-          <p:cNvPr id="142" name="CustomShape 3"/>
+          <p:cNvPr id="143" name="CustomShape 3"/>
           <p:cNvSpPr/>
           <p:nvPr/>
         </p:nvSpPr>
         <p:spPr>
           <a:xfrm>
             <a:off x="271800" y="1270800"/>
-            <a:ext cx="7560000" cy="821520"/>
+            <a:ext cx="7559640" cy="821160"/>
           </a:xfrm>
           <a:prstGeom prst="rect">
             <a:avLst/>
@@ -14296,7 +14341,7 @@
         <p:txBody>
           <a:bodyPr lIns="90000" rIns="90000" tIns="45000" bIns="45000"/>
           <a:p>
-            <a:pPr marL="457200" indent="-456480">
+            <a:pPr marL="457200" indent="-456120">
               <a:lnSpc>
                 <a:spcPct val="100000"/>
               </a:lnSpc>
@@ -14385,14 +14430,14 @@
       </p:sp>
       <p:sp>
         <p:nvSpPr>
-          <p:cNvPr id="143" name="CustomShape 4"/>
+          <p:cNvPr id="144" name="CustomShape 4"/>
           <p:cNvSpPr/>
           <p:nvPr/>
         </p:nvSpPr>
         <p:spPr>
           <a:xfrm>
             <a:off x="1630800" y="3900960"/>
-            <a:ext cx="1523160" cy="608760"/>
+            <a:ext cx="1522800" cy="608400"/>
           </a:xfrm>
           <a:prstGeom prst="rect">
             <a:avLst/>
@@ -14452,14 +14497,14 @@
       </p:sp>
       <p:sp>
         <p:nvSpPr>
-          <p:cNvPr id="144" name="CustomShape 5"/>
+          <p:cNvPr id="145" name="CustomShape 5"/>
           <p:cNvSpPr/>
           <p:nvPr/>
         </p:nvSpPr>
         <p:spPr>
           <a:xfrm>
             <a:off x="3445920" y="3924360"/>
-            <a:ext cx="1523160" cy="608760"/>
+            <a:ext cx="1522800" cy="608400"/>
           </a:xfrm>
           <a:prstGeom prst="rect">
             <a:avLst/>
@@ -14519,14 +14564,14 @@
       </p:sp>
       <p:sp>
         <p:nvSpPr>
-          <p:cNvPr id="145" name="CustomShape 6"/>
+          <p:cNvPr id="146" name="CustomShape 6"/>
           <p:cNvSpPr/>
           <p:nvPr/>
         </p:nvSpPr>
         <p:spPr>
           <a:xfrm>
             <a:off x="5330520" y="3924360"/>
-            <a:ext cx="1528200" cy="608760"/>
+            <a:ext cx="1527840" cy="608400"/>
           </a:xfrm>
           <a:prstGeom prst="rect">
             <a:avLst/>
@@ -14586,14 +14631,14 @@
       </p:sp>
       <p:sp>
         <p:nvSpPr>
-          <p:cNvPr id="146" name="CustomShape 7"/>
+          <p:cNvPr id="147" name="CustomShape 7"/>
           <p:cNvSpPr/>
           <p:nvPr/>
         </p:nvSpPr>
         <p:spPr>
           <a:xfrm>
             <a:off x="2771640" y="6030360"/>
-            <a:ext cx="3065040" cy="325800"/>
+            <a:ext cx="3064680" cy="325440"/>
           </a:xfrm>
           <a:prstGeom prst="rect">
             <a:avLst/>
@@ -14653,14 +14698,14 @@
       </p:sp>
       <p:sp>
         <p:nvSpPr>
-          <p:cNvPr id="147" name="CustomShape 8"/>
+          <p:cNvPr id="148" name="CustomShape 8"/>
           <p:cNvSpPr/>
           <p:nvPr/>
         </p:nvSpPr>
         <p:spPr>
           <a:xfrm>
             <a:off x="3548160" y="4852080"/>
-            <a:ext cx="1318680" cy="859680"/>
+            <a:ext cx="1318320" cy="859320"/>
           </a:xfrm>
           <a:prstGeom prst="diamond">
             <a:avLst/>
@@ -14723,14 +14768,14 @@
       </p:sp>
       <p:sp>
         <p:nvSpPr>
-          <p:cNvPr id="148" name="CustomShape 9"/>
+          <p:cNvPr id="149" name="CustomShape 9"/>
           <p:cNvSpPr/>
           <p:nvPr/>
         </p:nvSpPr>
         <p:spPr>
           <a:xfrm flipV="1">
-            <a:off x="4208040" y="5711760"/>
-            <a:ext cx="16200" cy="317520"/>
+            <a:off x="4208040" y="5711040"/>
+            <a:ext cx="15840" cy="317160"/>
           </a:xfrm>
           <a:custGeom>
             <a:avLst/>
@@ -14774,14 +14819,14 @@
       </p:sp>
       <p:sp>
         <p:nvSpPr>
-          <p:cNvPr id="149" name="CustomShape 10"/>
+          <p:cNvPr id="150" name="CustomShape 10"/>
           <p:cNvSpPr/>
           <p:nvPr/>
         </p:nvSpPr>
         <p:spPr>
           <a:xfrm flipH="1" flipV="1">
-            <a:off x="2322720" y="4533480"/>
-            <a:ext cx="1224000" cy="747360"/>
+            <a:off x="2322000" y="4532760"/>
+            <a:ext cx="1223640" cy="747000"/>
           </a:xfrm>
           <a:custGeom>
             <a:avLst/>
@@ -14825,14 +14870,14 @@
       </p:sp>
       <p:sp>
         <p:nvSpPr>
-          <p:cNvPr id="150" name="CustomShape 11"/>
+          <p:cNvPr id="151" name="CustomShape 11"/>
           <p:cNvSpPr/>
           <p:nvPr/>
         </p:nvSpPr>
         <p:spPr>
           <a:xfrm flipV="1">
             <a:off x="4208040" y="4533480"/>
-            <a:ext cx="360" cy="301320"/>
+            <a:ext cx="360" cy="300960"/>
           </a:xfrm>
           <a:custGeom>
             <a:avLst/>
@@ -14876,14 +14921,14 @@
       </p:sp>
       <p:sp>
         <p:nvSpPr>
-          <p:cNvPr id="151" name="CustomShape 12"/>
+          <p:cNvPr id="152" name="CustomShape 12"/>
           <p:cNvSpPr/>
           <p:nvPr/>
         </p:nvSpPr>
         <p:spPr>
           <a:xfrm flipV="1">
             <a:off x="4867560" y="4533480"/>
-            <a:ext cx="1226520" cy="758520"/>
+            <a:ext cx="1226160" cy="758160"/>
           </a:xfrm>
           <a:custGeom>
             <a:avLst/>
@@ -14927,14 +14972,14 @@
       </p:sp>
       <p:sp>
         <p:nvSpPr>
-          <p:cNvPr id="152" name="CustomShape 13"/>
+          <p:cNvPr id="153" name="CustomShape 13"/>
           <p:cNvSpPr/>
           <p:nvPr/>
         </p:nvSpPr>
         <p:spPr>
           <a:xfrm>
             <a:off x="3293640" y="2819520"/>
-            <a:ext cx="1828080" cy="837360"/>
+            <a:ext cx="1827720" cy="837000"/>
           </a:xfrm>
           <a:prstGeom prst="ellipse">
             <a:avLst/>
@@ -14997,14 +15042,14 @@
       </p:sp>
       <p:sp>
         <p:nvSpPr>
-          <p:cNvPr id="153" name="CustomShape 14"/>
+          <p:cNvPr id="154" name="CustomShape 14"/>
           <p:cNvSpPr/>
           <p:nvPr/>
         </p:nvSpPr>
         <p:spPr>
           <a:xfrm flipV="1">
             <a:off x="4208040" y="3656880"/>
-            <a:ext cx="360" cy="266040"/>
+            <a:ext cx="360" cy="265680"/>
           </a:xfrm>
           <a:custGeom>
             <a:avLst/>
@@ -15048,14 +15093,14 @@
       </p:sp>
       <p:sp>
         <p:nvSpPr>
-          <p:cNvPr id="154" name="CustomShape 15"/>
+          <p:cNvPr id="155" name="CustomShape 15"/>
           <p:cNvSpPr/>
           <p:nvPr/>
         </p:nvSpPr>
         <p:spPr>
           <a:xfrm flipV="1">
             <a:off x="4208040" y="2588760"/>
-            <a:ext cx="360" cy="229320"/>
+            <a:ext cx="360" cy="228960"/>
           </a:xfrm>
           <a:custGeom>
             <a:avLst/>
@@ -15099,14 +15144,14 @@
       </p:sp>
       <p:sp>
         <p:nvSpPr>
-          <p:cNvPr id="155" name="CustomShape 16"/>
+          <p:cNvPr id="156" name="CustomShape 16"/>
           <p:cNvSpPr/>
           <p:nvPr/>
         </p:nvSpPr>
         <p:spPr>
           <a:xfrm>
             <a:off x="3712680" y="1700640"/>
-            <a:ext cx="990000" cy="910800"/>
+            <a:ext cx="989640" cy="910440"/>
           </a:xfrm>
           <a:prstGeom prst="can">
             <a:avLst>
@@ -15168,14 +15213,14 @@
       </p:sp>
       <p:sp>
         <p:nvSpPr>
-          <p:cNvPr id="156" name="CustomShape 17"/>
+          <p:cNvPr id="157" name="CustomShape 17"/>
           <p:cNvSpPr/>
           <p:nvPr/>
         </p:nvSpPr>
         <p:spPr>
           <a:xfrm>
             <a:off x="6300360" y="2612520"/>
-            <a:ext cx="1980360" cy="1023120"/>
+            <a:ext cx="1980000" cy="1022760"/>
           </a:xfrm>
           <a:prstGeom prst="cloud">
             <a:avLst/>
@@ -15243,14 +15288,14 @@
       </p:sp>
       <p:sp>
         <p:nvSpPr>
-          <p:cNvPr id="157" name="CustomShape 18"/>
+          <p:cNvPr id="158" name="CustomShape 18"/>
           <p:cNvSpPr/>
           <p:nvPr/>
         </p:nvSpPr>
         <p:spPr>
           <a:xfrm flipH="1">
-            <a:off x="5121720" y="3238560"/>
-            <a:ext cx="1223280" cy="360"/>
+            <a:off x="5121000" y="3238560"/>
+            <a:ext cx="1222920" cy="360"/>
           </a:xfrm>
           <a:custGeom>
             <a:avLst/>
@@ -15343,14 +15388,14 @@
       </p:grpSpPr>
       <p:sp>
         <p:nvSpPr>
-          <p:cNvPr id="158" name="CustomShape 1"/>
+          <p:cNvPr id="159" name="CustomShape 1"/>
           <p:cNvSpPr/>
           <p:nvPr/>
         </p:nvSpPr>
         <p:spPr>
           <a:xfrm>
             <a:off x="470880" y="1428840"/>
-            <a:ext cx="7560000" cy="1431360"/>
+            <a:ext cx="7559640" cy="1431000"/>
           </a:xfrm>
           <a:prstGeom prst="rect">
             <a:avLst/>
@@ -15369,7 +15414,7 @@
         <p:txBody>
           <a:bodyPr lIns="90000" rIns="90000" tIns="45000" bIns="45000"/>
           <a:p>
-            <a:pPr marL="457200" indent="-456480">
+            <a:pPr marL="457200" indent="-456120">
               <a:lnSpc>
                 <a:spcPct val="100000"/>
               </a:lnSpc>
@@ -15407,7 +15452,7 @@
             </a:endParaRPr>
           </a:p>
           <a:p>
-            <a:pPr marL="457200" indent="-456480">
+            <a:pPr marL="457200" indent="-456120">
               <a:lnSpc>
                 <a:spcPct val="100000"/>
               </a:lnSpc>
@@ -15445,7 +15490,7 @@
             </a:endParaRPr>
           </a:p>
           <a:p>
-            <a:pPr marL="457200" indent="-456480">
+            <a:pPr marL="457200" indent="-456120">
               <a:lnSpc>
                 <a:spcPct val="100000"/>
               </a:lnSpc>
@@ -15486,14 +15531,14 @@
       </p:sp>
       <p:sp>
         <p:nvSpPr>
-          <p:cNvPr id="159" name="CustomShape 2"/>
+          <p:cNvPr id="160" name="CustomShape 2"/>
           <p:cNvSpPr/>
           <p:nvPr/>
         </p:nvSpPr>
         <p:spPr>
           <a:xfrm>
             <a:off x="612720" y="6375600"/>
-            <a:ext cx="1980360" cy="365040"/>
+            <a:ext cx="1980000" cy="364680"/>
           </a:xfrm>
           <a:prstGeom prst="rect">
             <a:avLst/>
@@ -15517,7 +15562,7 @@
                 <a:spcPct val="100000"/>
               </a:lnSpc>
             </a:pPr>
-            <a:fld id="{45CE20C5-9F26-424A-9420-7B9921A140DC}" type="slidenum">
+            <a:fld id="{32C8BBCA-D953-4C4B-A3D6-6267D72898EB}" type="slidenum">
               <a:rPr b="1" lang="en-US" sz="1400" spc="-1" strike="noStrike">
                 <a:solidFill>
                   <a:srgbClr val="464653"/>
@@ -15548,14 +15593,14 @@
       </p:sp>
       <p:sp>
         <p:nvSpPr>
-          <p:cNvPr id="160" name="CustomShape 3"/>
+          <p:cNvPr id="161" name="CustomShape 3"/>
           <p:cNvSpPr/>
           <p:nvPr/>
         </p:nvSpPr>
         <p:spPr>
           <a:xfrm>
             <a:off x="457200" y="152280"/>
-            <a:ext cx="8228880" cy="990000"/>
+            <a:ext cx="8228520" cy="989640"/>
           </a:xfrm>
           <a:prstGeom prst="rect">
             <a:avLst/>
@@ -15610,14 +15655,14 @@
       </p:sp>
       <p:sp>
         <p:nvSpPr>
-          <p:cNvPr id="161" name="CustomShape 4"/>
+          <p:cNvPr id="162" name="CustomShape 4"/>
           <p:cNvSpPr/>
           <p:nvPr/>
         </p:nvSpPr>
         <p:spPr>
           <a:xfrm>
             <a:off x="457200" y="2842560"/>
-            <a:ext cx="7830360" cy="3535200"/>
+            <a:ext cx="7830000" cy="3534840"/>
           </a:xfrm>
           <a:prstGeom prst="rect">
             <a:avLst/>
@@ -15636,7 +15681,7 @@
         <p:txBody>
           <a:bodyPr lIns="90000" rIns="90000" tIns="45000" bIns="45000"/>
           <a:p>
-            <a:pPr marL="457200" indent="-456480">
+            <a:pPr marL="457200" indent="-456120">
               <a:lnSpc>
                 <a:spcPct val="100000"/>
               </a:lnSpc>
@@ -15689,7 +15734,7 @@
             </a:endParaRPr>
           </a:p>
           <a:p>
-            <a:pPr marL="457200" indent="-456480">
+            <a:pPr marL="457200" indent="-456120">
               <a:lnSpc>
                 <a:spcPct val="100000"/>
               </a:lnSpc>
@@ -16012,7 +16057,7 @@
       </p:sp>
       <p:pic>
         <p:nvPicPr>
-          <p:cNvPr id="162" name="Picture 2" descr=""/>
+          <p:cNvPr id="163" name="Picture 2" descr=""/>
           <p:cNvPicPr/>
           <p:nvPr/>
         </p:nvPicPr>
@@ -16023,7 +16068,7 @@
         <p:spPr>
           <a:xfrm>
             <a:off x="1218960" y="4033080"/>
-            <a:ext cx="2662560" cy="2143800"/>
+            <a:ext cx="2662200" cy="2143440"/>
           </a:xfrm>
           <a:prstGeom prst="rect">
             <a:avLst/>
@@ -16035,7 +16080,7 @@
       </p:pic>
       <p:pic>
         <p:nvPicPr>
-          <p:cNvPr id="163" name="Picture 4" descr=""/>
+          <p:cNvPr id="164" name="Picture 4" descr=""/>
           <p:cNvPicPr/>
           <p:nvPr/>
         </p:nvPicPr>
@@ -16046,7 +16091,7 @@
         <p:spPr>
           <a:xfrm>
             <a:off x="4609800" y="4020480"/>
-            <a:ext cx="2711520" cy="2252520"/>
+            <a:ext cx="2711160" cy="2252160"/>
           </a:xfrm>
           <a:prstGeom prst="rect">
             <a:avLst/>

</xml_diff>